<commit_message>
Memory and Time Profiler Complete. Presentation Updated
</commit_message>
<xml_diff>
--- a/Retiming10670388_ProjectPresentation.pptx
+++ b/Retiming10670388_ProjectPresentation.pptx
@@ -5,7 +5,7 @@
     <p:sldMasterId id="2147483660" r:id="rId1"/>
   </p:sldMasterIdLst>
   <p:notesMasterIdLst>
-    <p:notesMasterId r:id="rId21"/>
+    <p:notesMasterId r:id="rId22"/>
   </p:notesMasterIdLst>
   <p:sldIdLst>
     <p:sldId id="256" r:id="rId2"/>
@@ -22,11 +22,12 @@
     <p:sldId id="273" r:id="rId13"/>
     <p:sldId id="276" r:id="rId14"/>
     <p:sldId id="274" r:id="rId15"/>
-    <p:sldId id="275" r:id="rId16"/>
-    <p:sldId id="269" r:id="rId17"/>
-    <p:sldId id="270" r:id="rId18"/>
-    <p:sldId id="271" r:id="rId19"/>
-    <p:sldId id="259" r:id="rId20"/>
+    <p:sldId id="277" r:id="rId16"/>
+    <p:sldId id="275" r:id="rId17"/>
+    <p:sldId id="269" r:id="rId18"/>
+    <p:sldId id="270" r:id="rId19"/>
+    <p:sldId id="271" r:id="rId20"/>
+    <p:sldId id="259" r:id="rId21"/>
   </p:sldIdLst>
   <p:sldSz cx="12192000" cy="6858000"/>
   <p:notesSz cx="6858000" cy="9144000"/>
@@ -148,7 +149,7 @@
 <file path=ppt/revisionInfo.xml><?xml version="1.0" encoding="utf-8"?>
 <p1510:revInfo xmlns:a="http://schemas.openxmlformats.org/drawingml/2006/main" xmlns:r="http://schemas.openxmlformats.org/officeDocument/2006/relationships" xmlns:p1510="http://schemas.microsoft.com/office/powerpoint/2015/10/main">
   <p1510:revLst>
-    <p1510:client id="{CDAB1E75-1FDE-4F40-80F3-634554960AF9}" v="247" dt="2020-10-04T17:13:47.093"/>
+    <p1510:client id="{CDAB1E75-1FDE-4F40-80F3-634554960AF9}" v="252" dt="2020-10-05T00:04:45.578"/>
   </p1510:revLst>
 </p1510:revInfo>
 </file>
@@ -158,7 +159,7 @@
   <pc:docChgLst>
     <pc:chgData name="Samuel Polo" userId="c75c2d6ea6afc445" providerId="LiveId" clId="{CDAB1E75-1FDE-4F40-80F3-634554960AF9}"/>
     <pc:docChg chg="undo custSel mod addSld delSld modSld">
-      <pc:chgData name="Samuel Polo" userId="c75c2d6ea6afc445" providerId="LiveId" clId="{CDAB1E75-1FDE-4F40-80F3-634554960AF9}" dt="2020-10-04T17:31:19.198" v="3660" actId="20577"/>
+      <pc:chgData name="Samuel Polo" userId="c75c2d6ea6afc445" providerId="LiveId" clId="{CDAB1E75-1FDE-4F40-80F3-634554960AF9}" dt="2020-10-05T00:04:58.245" v="3705" actId="26606"/>
       <pc:docMkLst>
         <pc:docMk/>
       </pc:docMkLst>
@@ -802,6 +803,245 @@
           <pc:sldMk cId="315394558" sldId="277"/>
         </pc:sldMkLst>
       </pc:sldChg>
+      <pc:sldChg chg="addSp delSp modSp new mod setBg">
+        <pc:chgData name="Samuel Polo" userId="c75c2d6ea6afc445" providerId="LiveId" clId="{CDAB1E75-1FDE-4F40-80F3-634554960AF9}" dt="2020-10-05T00:04:58.245" v="3705" actId="26606"/>
+        <pc:sldMkLst>
+          <pc:docMk/>
+          <pc:sldMk cId="2909672955" sldId="277"/>
+        </pc:sldMkLst>
+        <pc:spChg chg="del mod ord">
+          <ac:chgData name="Samuel Polo" userId="c75c2d6ea6afc445" providerId="LiveId" clId="{CDAB1E75-1FDE-4F40-80F3-634554960AF9}" dt="2020-10-05T00:04:51.217" v="3704" actId="478"/>
+          <ac:spMkLst>
+            <pc:docMk/>
+            <pc:sldMk cId="2909672955" sldId="277"/>
+            <ac:spMk id="2" creationId="{5003819D-363C-41D1-BCC8-B3D604943B99}"/>
+          </ac:spMkLst>
+        </pc:spChg>
+        <pc:spChg chg="del">
+          <ac:chgData name="Samuel Polo" userId="c75c2d6ea6afc445" providerId="LiveId" clId="{CDAB1E75-1FDE-4F40-80F3-634554960AF9}" dt="2020-10-05T00:01:52.427" v="3662" actId="478"/>
+          <ac:spMkLst>
+            <pc:docMk/>
+            <pc:sldMk cId="2909672955" sldId="277"/>
+            <ac:spMk id="3" creationId="{6F556CF5-5791-44EF-876D-C1F05F0FF354}"/>
+          </ac:spMkLst>
+        </pc:spChg>
+        <pc:spChg chg="add">
+          <ac:chgData name="Samuel Polo" userId="c75c2d6ea6afc445" providerId="LiveId" clId="{CDAB1E75-1FDE-4F40-80F3-634554960AF9}" dt="2020-10-05T00:04:58.245" v="3705" actId="26606"/>
+          <ac:spMkLst>
+            <pc:docMk/>
+            <pc:sldMk cId="2909672955" sldId="277"/>
+            <ac:spMk id="7" creationId="{C2579DAE-C141-48DB-810E-C070C300819E}"/>
+          </ac:spMkLst>
+        </pc:spChg>
+        <pc:spChg chg="add">
+          <ac:chgData name="Samuel Polo" userId="c75c2d6ea6afc445" providerId="LiveId" clId="{CDAB1E75-1FDE-4F40-80F3-634554960AF9}" dt="2020-10-05T00:04:58.245" v="3705" actId="26606"/>
+          <ac:spMkLst>
+            <pc:docMk/>
+            <pc:sldMk cId="2909672955" sldId="277"/>
+            <ac:spMk id="8" creationId="{02FD90C3-6350-4D5B-9738-6E94EDF30F74}"/>
+          </ac:spMkLst>
+        </pc:spChg>
+        <pc:spChg chg="add">
+          <ac:chgData name="Samuel Polo" userId="c75c2d6ea6afc445" providerId="LiveId" clId="{CDAB1E75-1FDE-4F40-80F3-634554960AF9}" dt="2020-10-05T00:04:58.245" v="3705" actId="26606"/>
+          <ac:spMkLst>
+            <pc:docMk/>
+            <pc:sldMk cId="2909672955" sldId="277"/>
+            <ac:spMk id="9" creationId="{41497DE5-0939-4D1D-9350-0C5E1B209C68}"/>
+          </ac:spMkLst>
+        </pc:spChg>
+        <pc:spChg chg="add del">
+          <ac:chgData name="Samuel Polo" userId="c75c2d6ea6afc445" providerId="LiveId" clId="{CDAB1E75-1FDE-4F40-80F3-634554960AF9}" dt="2020-10-05T00:02:13.618" v="3667" actId="26606"/>
+          <ac:spMkLst>
+            <pc:docMk/>
+            <pc:sldMk cId="2909672955" sldId="277"/>
+            <ac:spMk id="10" creationId="{25C8D2C1-DA83-420D-9635-D52CE066B5DA}"/>
+          </ac:spMkLst>
+        </pc:spChg>
+        <pc:spChg chg="add">
+          <ac:chgData name="Samuel Polo" userId="c75c2d6ea6afc445" providerId="LiveId" clId="{CDAB1E75-1FDE-4F40-80F3-634554960AF9}" dt="2020-10-05T00:04:58.245" v="3705" actId="26606"/>
+          <ac:spMkLst>
+            <pc:docMk/>
+            <pc:sldMk cId="2909672955" sldId="277"/>
+            <ac:spMk id="11" creationId="{5CCC70ED-6C63-4537-B7EB-51990D6C0A6F}"/>
+          </ac:spMkLst>
+        </pc:spChg>
+        <pc:spChg chg="add del">
+          <ac:chgData name="Samuel Polo" userId="c75c2d6ea6afc445" providerId="LiveId" clId="{CDAB1E75-1FDE-4F40-80F3-634554960AF9}" dt="2020-10-05T00:02:13.618" v="3667" actId="26606"/>
+          <ac:spMkLst>
+            <pc:docMk/>
+            <pc:sldMk cId="2909672955" sldId="277"/>
+            <ac:spMk id="12" creationId="{434F74C9-6A0B-409E-AD1C-45B58BE91BB8}"/>
+          </ac:spMkLst>
+        </pc:spChg>
+        <pc:spChg chg="add">
+          <ac:chgData name="Samuel Polo" userId="c75c2d6ea6afc445" providerId="LiveId" clId="{CDAB1E75-1FDE-4F40-80F3-634554960AF9}" dt="2020-10-05T00:04:58.245" v="3705" actId="26606"/>
+          <ac:spMkLst>
+            <pc:docMk/>
+            <pc:sldMk cId="2909672955" sldId="277"/>
+            <ac:spMk id="13" creationId="{B76E24C1-2968-40DC-A36E-F6B85F0F0752}"/>
+          </ac:spMkLst>
+        </pc:spChg>
+        <pc:spChg chg="add del">
+          <ac:chgData name="Samuel Polo" userId="c75c2d6ea6afc445" providerId="LiveId" clId="{CDAB1E75-1FDE-4F40-80F3-634554960AF9}" dt="2020-10-05T00:02:13.618" v="3667" actId="26606"/>
+          <ac:spMkLst>
+            <pc:docMk/>
+            <pc:sldMk cId="2909672955" sldId="277"/>
+            <ac:spMk id="16" creationId="{90AA6468-80AC-4DDF-9CFB-C7A9507E203F}"/>
+          </ac:spMkLst>
+        </pc:spChg>
+        <pc:spChg chg="add del">
+          <ac:chgData name="Samuel Polo" userId="c75c2d6ea6afc445" providerId="LiveId" clId="{CDAB1E75-1FDE-4F40-80F3-634554960AF9}" dt="2020-10-05T00:02:13.618" v="3667" actId="26606"/>
+          <ac:spMkLst>
+            <pc:docMk/>
+            <pc:sldMk cId="2909672955" sldId="277"/>
+            <ac:spMk id="18" creationId="{4AB900CC-5074-4746-A1A4-AF640455BD43}"/>
+          </ac:spMkLst>
+        </pc:spChg>
+        <pc:spChg chg="add del">
+          <ac:chgData name="Samuel Polo" userId="c75c2d6ea6afc445" providerId="LiveId" clId="{CDAB1E75-1FDE-4F40-80F3-634554960AF9}" dt="2020-10-05T00:04:46.767" v="3703" actId="26606"/>
+          <ac:spMkLst>
+            <pc:docMk/>
+            <pc:sldMk cId="2909672955" sldId="277"/>
+            <ac:spMk id="20" creationId="{5AC4BE46-4A77-42FE-9D15-065CDB2F847C}"/>
+          </ac:spMkLst>
+        </pc:spChg>
+        <pc:spChg chg="add del">
+          <ac:chgData name="Samuel Polo" userId="c75c2d6ea6afc445" providerId="LiveId" clId="{CDAB1E75-1FDE-4F40-80F3-634554960AF9}" dt="2020-10-05T00:04:46.767" v="3703" actId="26606"/>
+          <ac:spMkLst>
+            <pc:docMk/>
+            <pc:sldMk cId="2909672955" sldId="277"/>
+            <ac:spMk id="21" creationId="{4E4490D0-3672-446A-AC12-B4830333BDDD}"/>
+          </ac:spMkLst>
+        </pc:spChg>
+        <pc:spChg chg="add del">
+          <ac:chgData name="Samuel Polo" userId="c75c2d6ea6afc445" providerId="LiveId" clId="{CDAB1E75-1FDE-4F40-80F3-634554960AF9}" dt="2020-10-05T00:04:46.767" v="3703" actId="26606"/>
+          <ac:spMkLst>
+            <pc:docMk/>
+            <pc:sldMk cId="2909672955" sldId="277"/>
+            <ac:spMk id="22" creationId="{39CB82C2-DF65-4EC1-8280-F201D50F570B}"/>
+          </ac:spMkLst>
+        </pc:spChg>
+        <pc:spChg chg="add del">
+          <ac:chgData name="Samuel Polo" userId="c75c2d6ea6afc445" providerId="LiveId" clId="{CDAB1E75-1FDE-4F40-80F3-634554960AF9}" dt="2020-10-05T00:04:46.767" v="3703" actId="26606"/>
+          <ac:spMkLst>
+            <pc:docMk/>
+            <pc:sldMk cId="2909672955" sldId="277"/>
+            <ac:spMk id="24" creationId="{5A1B47C8-47A0-4A88-8830-6DEA3B5DE392}"/>
+          </ac:spMkLst>
+        </pc:spChg>
+        <pc:spChg chg="add del">
+          <ac:chgData name="Samuel Polo" userId="c75c2d6ea6afc445" providerId="LiveId" clId="{CDAB1E75-1FDE-4F40-80F3-634554960AF9}" dt="2020-10-05T00:04:46.767" v="3703" actId="26606"/>
+          <ac:spMkLst>
+            <pc:docMk/>
+            <pc:sldMk cId="2909672955" sldId="277"/>
+            <ac:spMk id="25" creationId="{984BBFDD-E720-4805-A9C8-129FBBF6DD70}"/>
+          </ac:spMkLst>
+        </pc:spChg>
+        <pc:spChg chg="add del">
+          <ac:chgData name="Samuel Polo" userId="c75c2d6ea6afc445" providerId="LiveId" clId="{CDAB1E75-1FDE-4F40-80F3-634554960AF9}" dt="2020-10-05T00:04:39.223" v="3699" actId="26606"/>
+          <ac:spMkLst>
+            <pc:docMk/>
+            <pc:sldMk cId="2909672955" sldId="277"/>
+            <ac:spMk id="27" creationId="{25C8D2C1-DA83-420D-9635-D52CE066B5DA}"/>
+          </ac:spMkLst>
+        </pc:spChg>
+        <pc:spChg chg="add del">
+          <ac:chgData name="Samuel Polo" userId="c75c2d6ea6afc445" providerId="LiveId" clId="{CDAB1E75-1FDE-4F40-80F3-634554960AF9}" dt="2020-10-05T00:04:39.223" v="3699" actId="26606"/>
+          <ac:spMkLst>
+            <pc:docMk/>
+            <pc:sldMk cId="2909672955" sldId="277"/>
+            <ac:spMk id="28" creationId="{434F74C9-6A0B-409E-AD1C-45B58BE91BB8}"/>
+          </ac:spMkLst>
+        </pc:spChg>
+        <pc:spChg chg="add del">
+          <ac:chgData name="Samuel Polo" userId="c75c2d6ea6afc445" providerId="LiveId" clId="{CDAB1E75-1FDE-4F40-80F3-634554960AF9}" dt="2020-10-05T00:03:52.591" v="3690" actId="26606"/>
+          <ac:spMkLst>
+            <pc:docMk/>
+            <pc:sldMk cId="2909672955" sldId="277"/>
+            <ac:spMk id="30" creationId="{25C8D2C1-DA83-420D-9635-D52CE066B5DA}"/>
+          </ac:spMkLst>
+        </pc:spChg>
+        <pc:spChg chg="add del">
+          <ac:chgData name="Samuel Polo" userId="c75c2d6ea6afc445" providerId="LiveId" clId="{CDAB1E75-1FDE-4F40-80F3-634554960AF9}" dt="2020-10-05T00:04:39.223" v="3699" actId="26606"/>
+          <ac:spMkLst>
+            <pc:docMk/>
+            <pc:sldMk cId="2909672955" sldId="277"/>
+            <ac:spMk id="31" creationId="{90AA6468-80AC-4DDF-9CFB-C7A9507E203F}"/>
+          </ac:spMkLst>
+        </pc:spChg>
+        <pc:spChg chg="add del">
+          <ac:chgData name="Samuel Polo" userId="c75c2d6ea6afc445" providerId="LiveId" clId="{CDAB1E75-1FDE-4F40-80F3-634554960AF9}" dt="2020-10-05T00:03:52.591" v="3690" actId="26606"/>
+          <ac:spMkLst>
+            <pc:docMk/>
+            <pc:sldMk cId="2909672955" sldId="277"/>
+            <ac:spMk id="32" creationId="{434F74C9-6A0B-409E-AD1C-45B58BE91BB8}"/>
+          </ac:spMkLst>
+        </pc:spChg>
+        <pc:spChg chg="add del">
+          <ac:chgData name="Samuel Polo" userId="c75c2d6ea6afc445" providerId="LiveId" clId="{CDAB1E75-1FDE-4F40-80F3-634554960AF9}" dt="2020-10-05T00:04:39.223" v="3699" actId="26606"/>
+          <ac:spMkLst>
+            <pc:docMk/>
+            <pc:sldMk cId="2909672955" sldId="277"/>
+            <ac:spMk id="33" creationId="{4AB900CC-5074-4746-A1A4-AF640455BD43}"/>
+          </ac:spMkLst>
+        </pc:spChg>
+        <pc:spChg chg="add del">
+          <ac:chgData name="Samuel Polo" userId="c75c2d6ea6afc445" providerId="LiveId" clId="{CDAB1E75-1FDE-4F40-80F3-634554960AF9}" dt="2020-10-05T00:03:52.591" v="3690" actId="26606"/>
+          <ac:spMkLst>
+            <pc:docMk/>
+            <pc:sldMk cId="2909672955" sldId="277"/>
+            <ac:spMk id="36" creationId="{90AA6468-80AC-4DDF-9CFB-C7A9507E203F}"/>
+          </ac:spMkLst>
+        </pc:spChg>
+        <pc:spChg chg="add del">
+          <ac:chgData name="Samuel Polo" userId="c75c2d6ea6afc445" providerId="LiveId" clId="{CDAB1E75-1FDE-4F40-80F3-634554960AF9}" dt="2020-10-05T00:03:52.591" v="3690" actId="26606"/>
+          <ac:spMkLst>
+            <pc:docMk/>
+            <pc:sldMk cId="2909672955" sldId="277"/>
+            <ac:spMk id="38" creationId="{4AB900CC-5074-4746-A1A4-AF640455BD43}"/>
+          </ac:spMkLst>
+        </pc:spChg>
+        <pc:picChg chg="add mod ord">
+          <ac:chgData name="Samuel Polo" userId="c75c2d6ea6afc445" providerId="LiveId" clId="{CDAB1E75-1FDE-4F40-80F3-634554960AF9}" dt="2020-10-05T00:04:58.245" v="3705" actId="26606"/>
+          <ac:picMkLst>
+            <pc:docMk/>
+            <pc:sldMk cId="2909672955" sldId="277"/>
+            <ac:picMk id="5" creationId="{43611857-6A72-42AC-B666-B76266E39A84}"/>
+          </ac:picMkLst>
+        </pc:picChg>
+        <pc:cxnChg chg="add del">
+          <ac:chgData name="Samuel Polo" userId="c75c2d6ea6afc445" providerId="LiveId" clId="{CDAB1E75-1FDE-4F40-80F3-634554960AF9}" dt="2020-10-05T00:02:13.618" v="3667" actId="26606"/>
+          <ac:cxnSpMkLst>
+            <pc:docMk/>
+            <pc:sldMk cId="2909672955" sldId="277"/>
+            <ac:cxnSpMk id="14" creationId="{F5486A9D-1265-4B57-91E6-68E666B978BC}"/>
+          </ac:cxnSpMkLst>
+        </pc:cxnChg>
+        <pc:cxnChg chg="add del">
+          <ac:chgData name="Samuel Polo" userId="c75c2d6ea6afc445" providerId="LiveId" clId="{CDAB1E75-1FDE-4F40-80F3-634554960AF9}" dt="2020-10-05T00:04:46.767" v="3703" actId="26606"/>
+          <ac:cxnSpMkLst>
+            <pc:docMk/>
+            <pc:sldMk cId="2909672955" sldId="277"/>
+            <ac:cxnSpMk id="23" creationId="{7E1D4427-852B-4B37-8E76-0E9F1810BA2A}"/>
+          </ac:cxnSpMkLst>
+        </pc:cxnChg>
+        <pc:cxnChg chg="add del">
+          <ac:chgData name="Samuel Polo" userId="c75c2d6ea6afc445" providerId="LiveId" clId="{CDAB1E75-1FDE-4F40-80F3-634554960AF9}" dt="2020-10-05T00:04:39.223" v="3699" actId="26606"/>
+          <ac:cxnSpMkLst>
+            <pc:docMk/>
+            <pc:sldMk cId="2909672955" sldId="277"/>
+            <ac:cxnSpMk id="29" creationId="{F5486A9D-1265-4B57-91E6-68E666B978BC}"/>
+          </ac:cxnSpMkLst>
+        </pc:cxnChg>
+        <pc:cxnChg chg="add del">
+          <ac:chgData name="Samuel Polo" userId="c75c2d6ea6afc445" providerId="LiveId" clId="{CDAB1E75-1FDE-4F40-80F3-634554960AF9}" dt="2020-10-05T00:03:52.591" v="3690" actId="26606"/>
+          <ac:cxnSpMkLst>
+            <pc:docMk/>
+            <pc:sldMk cId="2909672955" sldId="277"/>
+            <ac:cxnSpMk id="34" creationId="{F5486A9D-1265-4B57-91E6-68E666B978BC}"/>
+          </ac:cxnSpMkLst>
+        </pc:cxnChg>
+      </pc:sldChg>
       <pc:sldChg chg="addSp delSp modSp new del mod setBg">
         <pc:chgData name="Samuel Polo" userId="c75c2d6ea6afc445" providerId="LiveId" clId="{CDAB1E75-1FDE-4F40-80F3-634554960AF9}" dt="2020-10-04T17:15:21.074" v="3491" actId="47"/>
         <pc:sldMkLst>
@@ -1064,6 +1304,116 @@
             <ac:cxnSpMk id="46" creationId="{04733B62-1719-4677-A612-CA0AC0AD7482}"/>
           </ac:cxnSpMkLst>
         </pc:cxnChg>
+      </pc:sldChg>
+      <pc:sldChg chg="addSp delSp modSp add del mod setBg delDesignElem">
+        <pc:chgData name="Samuel Polo" userId="c75c2d6ea6afc445" providerId="LiveId" clId="{CDAB1E75-1FDE-4F40-80F3-634554960AF9}" dt="2020-10-05T00:04:45.576" v="3702"/>
+        <pc:sldMkLst>
+          <pc:docMk/>
+          <pc:sldMk cId="3179230123" sldId="278"/>
+        </pc:sldMkLst>
+        <pc:spChg chg="mod">
+          <ac:chgData name="Samuel Polo" userId="c75c2d6ea6afc445" providerId="LiveId" clId="{CDAB1E75-1FDE-4F40-80F3-634554960AF9}" dt="2020-10-05T00:04:45.044" v="3701" actId="26606"/>
+          <ac:spMkLst>
+            <pc:docMk/>
+            <pc:sldMk cId="3179230123" sldId="278"/>
+            <ac:spMk id="2" creationId="{F9D2D38B-E23B-439D-B522-78D5248CD45D}"/>
+          </ac:spMkLst>
+        </pc:spChg>
+        <pc:spChg chg="mod">
+          <ac:chgData name="Samuel Polo" userId="c75c2d6ea6afc445" providerId="LiveId" clId="{CDAB1E75-1FDE-4F40-80F3-634554960AF9}" dt="2020-10-05T00:04:45.044" v="3701" actId="26606"/>
+          <ac:spMkLst>
+            <pc:docMk/>
+            <pc:sldMk cId="3179230123" sldId="278"/>
+            <ac:spMk id="3" creationId="{E58D4988-C6E5-438B-AAE5-007CF2455B4A}"/>
+          </ac:spMkLst>
+        </pc:spChg>
+        <pc:spChg chg="add del">
+          <ac:chgData name="Samuel Polo" userId="c75c2d6ea6afc445" providerId="LiveId" clId="{CDAB1E75-1FDE-4F40-80F3-634554960AF9}" dt="2020-10-05T00:04:45.044" v="3701" actId="26606"/>
+          <ac:spMkLst>
+            <pc:docMk/>
+            <pc:sldMk cId="3179230123" sldId="278"/>
+            <ac:spMk id="7" creationId="{990D0034-F768-41E7-85D4-F38C4DE85770}"/>
+          </ac:spMkLst>
+        </pc:spChg>
+        <pc:spChg chg="add del">
+          <ac:chgData name="Samuel Polo" userId="c75c2d6ea6afc445" providerId="LiveId" clId="{CDAB1E75-1FDE-4F40-80F3-634554960AF9}" dt="2020-10-05T00:04:45.044" v="3701" actId="26606"/>
+          <ac:spMkLst>
+            <pc:docMk/>
+            <pc:sldMk cId="3179230123" sldId="278"/>
+            <ac:spMk id="8" creationId="{C4F7E42D-8B5A-4FC8-81CD-9E60171F7FA8}"/>
+          </ac:spMkLst>
+        </pc:spChg>
+        <pc:spChg chg="add del">
+          <ac:chgData name="Samuel Polo" userId="c75c2d6ea6afc445" providerId="LiveId" clId="{CDAB1E75-1FDE-4F40-80F3-634554960AF9}" dt="2020-10-05T00:04:45.044" v="3701" actId="26606"/>
+          <ac:spMkLst>
+            <pc:docMk/>
+            <pc:sldMk cId="3179230123" sldId="278"/>
+            <ac:spMk id="9" creationId="{8C04651D-B9F4-4935-A02D-364153FBDF54}"/>
+          </ac:spMkLst>
+        </pc:spChg>
+        <pc:spChg chg="add del">
+          <ac:chgData name="Samuel Polo" userId="c75c2d6ea6afc445" providerId="LiveId" clId="{CDAB1E75-1FDE-4F40-80F3-634554960AF9}" dt="2020-10-05T00:04:45.576" v="3702"/>
+          <ac:spMkLst>
+            <pc:docMk/>
+            <pc:sldMk cId="3179230123" sldId="278"/>
+            <ac:spMk id="10" creationId="{44CC594A-A820-450F-B363-C19201FCFEC6}"/>
+          </ac:spMkLst>
+        </pc:spChg>
+        <pc:spChg chg="add del">
+          <ac:chgData name="Samuel Polo" userId="c75c2d6ea6afc445" providerId="LiveId" clId="{CDAB1E75-1FDE-4F40-80F3-634554960AF9}" dt="2020-10-05T00:04:45.576" v="3702"/>
+          <ac:spMkLst>
+            <pc:docMk/>
+            <pc:sldMk cId="3179230123" sldId="278"/>
+            <ac:spMk id="12" creationId="{59FAB3DA-E9ED-4574-ABCC-378BC0FF1BBC}"/>
+          </ac:spMkLst>
+        </pc:spChg>
+        <pc:spChg chg="add del">
+          <ac:chgData name="Samuel Polo" userId="c75c2d6ea6afc445" providerId="LiveId" clId="{CDAB1E75-1FDE-4F40-80F3-634554960AF9}" dt="2020-10-05T00:04:45.576" v="3702"/>
+          <ac:spMkLst>
+            <pc:docMk/>
+            <pc:sldMk cId="3179230123" sldId="278"/>
+            <ac:spMk id="14" creationId="{53B8D6B0-55D6-48DC-86D8-FD95D5F118AB}"/>
+          </ac:spMkLst>
+        </pc:spChg>
+        <pc:picChg chg="mod">
+          <ac:chgData name="Samuel Polo" userId="c75c2d6ea6afc445" providerId="LiveId" clId="{CDAB1E75-1FDE-4F40-80F3-634554960AF9}" dt="2020-10-05T00:04:45.044" v="3701" actId="26606"/>
+          <ac:picMkLst>
+            <pc:docMk/>
+            <pc:sldMk cId="3179230123" sldId="278"/>
+            <ac:picMk id="5" creationId="{4B6D1D81-1BE7-4E96-9D74-DBFD8DD9019A}"/>
+          </ac:picMkLst>
+        </pc:picChg>
+      </pc:sldChg>
+      <pc:sldChg chg="addSp delSp add del setBg delDesignElem">
+        <pc:chgData name="Samuel Polo" userId="c75c2d6ea6afc445" providerId="LiveId" clId="{CDAB1E75-1FDE-4F40-80F3-634554960AF9}" dt="2020-10-05T00:04:11.396" v="3695"/>
+        <pc:sldMkLst>
+          <pc:docMk/>
+          <pc:sldMk cId="4161374508" sldId="279"/>
+        </pc:sldMkLst>
+        <pc:spChg chg="add del">
+          <ac:chgData name="Samuel Polo" userId="c75c2d6ea6afc445" providerId="LiveId" clId="{CDAB1E75-1FDE-4F40-80F3-634554960AF9}" dt="2020-10-05T00:04:11.396" v="3695"/>
+          <ac:spMkLst>
+            <pc:docMk/>
+            <pc:sldMk cId="4161374508" sldId="279"/>
+            <ac:spMk id="10" creationId="{44CC594A-A820-450F-B363-C19201FCFEC6}"/>
+          </ac:spMkLst>
+        </pc:spChg>
+        <pc:spChg chg="add del">
+          <ac:chgData name="Samuel Polo" userId="c75c2d6ea6afc445" providerId="LiveId" clId="{CDAB1E75-1FDE-4F40-80F3-634554960AF9}" dt="2020-10-05T00:04:11.396" v="3695"/>
+          <ac:spMkLst>
+            <pc:docMk/>
+            <pc:sldMk cId="4161374508" sldId="279"/>
+            <ac:spMk id="12" creationId="{59FAB3DA-E9ED-4574-ABCC-378BC0FF1BBC}"/>
+          </ac:spMkLst>
+        </pc:spChg>
+        <pc:spChg chg="add del">
+          <ac:chgData name="Samuel Polo" userId="c75c2d6ea6afc445" providerId="LiveId" clId="{CDAB1E75-1FDE-4F40-80F3-634554960AF9}" dt="2020-10-05T00:04:11.396" v="3695"/>
+          <ac:spMkLst>
+            <pc:docMk/>
+            <pc:sldMk cId="4161374508" sldId="279"/>
+            <ac:spMk id="14" creationId="{53B8D6B0-55D6-48DC-86D8-FD95D5F118AB}"/>
+          </ac:spMkLst>
+        </pc:spChg>
       </pc:sldChg>
     </pc:docChg>
   </pc:docChgLst>
@@ -4831,7 +5181,7 @@
           <a:p>
             <a:fld id="{59AF899D-E7C2-4B08-B468-789D2F409BA7}" type="datetimeFigureOut">
               <a:rPr lang="it-IT" smtClean="0"/>
-              <a:t>04/10/2020</a:t>
+              <a:t>05/10/2020</a:t>
             </a:fld>
             <a:endParaRPr lang="it-IT"/>
           </a:p>
@@ -5829,7 +6179,7 @@
           <a:p>
             <a:fld id="{7F5567F1-2D95-49B6-A035-646F0D455395}" type="datetimeFigureOut">
               <a:rPr lang="it-IT" smtClean="0"/>
-              <a:t>04/10/2020</a:t>
+              <a:t>05/10/2020</a:t>
             </a:fld>
             <a:endParaRPr lang="it-IT"/>
           </a:p>
@@ -6037,7 +6387,7 @@
           <a:p>
             <a:fld id="{7F5567F1-2D95-49B6-A035-646F0D455395}" type="datetimeFigureOut">
               <a:rPr lang="it-IT" smtClean="0"/>
-              <a:t>04/10/2020</a:t>
+              <a:t>05/10/2020</a:t>
             </a:fld>
             <a:endParaRPr lang="it-IT"/>
           </a:p>
@@ -6293,7 +6643,7 @@
           <a:p>
             <a:fld id="{7F5567F1-2D95-49B6-A035-646F0D455395}" type="datetimeFigureOut">
               <a:rPr lang="it-IT" smtClean="0"/>
-              <a:t>04/10/2020</a:t>
+              <a:t>05/10/2020</a:t>
             </a:fld>
             <a:endParaRPr lang="it-IT"/>
           </a:p>
@@ -6467,7 +6817,7 @@
           <a:p>
             <a:fld id="{7F5567F1-2D95-49B6-A035-646F0D455395}" type="datetimeFigureOut">
               <a:rPr lang="it-IT" smtClean="0"/>
-              <a:t>04/10/2020</a:t>
+              <a:t>05/10/2020</a:t>
             </a:fld>
             <a:endParaRPr lang="it-IT"/>
           </a:p>
@@ -6810,7 +7160,7 @@
           <a:p>
             <a:fld id="{7F5567F1-2D95-49B6-A035-646F0D455395}" type="datetimeFigureOut">
               <a:rPr lang="it-IT" smtClean="0"/>
-              <a:t>04/10/2020</a:t>
+              <a:t>05/10/2020</a:t>
             </a:fld>
             <a:endParaRPr lang="it-IT"/>
           </a:p>
@@ -7085,7 +7435,7 @@
           <a:p>
             <a:fld id="{7F5567F1-2D95-49B6-A035-646F0D455395}" type="datetimeFigureOut">
               <a:rPr lang="it-IT" smtClean="0"/>
-              <a:t>04/10/2020</a:t>
+              <a:t>05/10/2020</a:t>
             </a:fld>
             <a:endParaRPr lang="it-IT"/>
           </a:p>
@@ -7464,7 +7814,7 @@
           <a:p>
             <a:fld id="{7F5567F1-2D95-49B6-A035-646F0D455395}" type="datetimeFigureOut">
               <a:rPr lang="it-IT" smtClean="0"/>
-              <a:t>04/10/2020</a:t>
+              <a:t>05/10/2020</a:t>
             </a:fld>
             <a:endParaRPr lang="it-IT"/>
           </a:p>
@@ -7582,7 +7932,7 @@
           <a:p>
             <a:fld id="{7F5567F1-2D95-49B6-A035-646F0D455395}" type="datetimeFigureOut">
               <a:rPr lang="it-IT" smtClean="0"/>
-              <a:t>04/10/2020</a:t>
+              <a:t>05/10/2020</a:t>
             </a:fld>
             <a:endParaRPr lang="it-IT"/>
           </a:p>
@@ -7753,7 +8103,7 @@
           <a:p>
             <a:fld id="{7F5567F1-2D95-49B6-A035-646F0D455395}" type="datetimeFigureOut">
               <a:rPr lang="it-IT" smtClean="0"/>
-              <a:t>04/10/2020</a:t>
+              <a:t>05/10/2020</a:t>
             </a:fld>
             <a:endParaRPr lang="it-IT"/>
           </a:p>
@@ -8107,7 +8457,7 @@
           <a:p>
             <a:fld id="{7F5567F1-2D95-49B6-A035-646F0D455395}" type="datetimeFigureOut">
               <a:rPr lang="it-IT" smtClean="0"/>
-              <a:t>04/10/2020</a:t>
+              <a:t>05/10/2020</a:t>
             </a:fld>
             <a:endParaRPr lang="it-IT"/>
           </a:p>
@@ -8489,7 +8839,7 @@
           <a:p>
             <a:fld id="{7F5567F1-2D95-49B6-A035-646F0D455395}" type="datetimeFigureOut">
               <a:rPr lang="it-IT" smtClean="0"/>
-              <a:t>04/10/2020</a:t>
+              <a:t>05/10/2020</a:t>
             </a:fld>
             <a:endParaRPr lang="it-IT"/>
           </a:p>
@@ -8776,7 +9126,7 @@
           <a:p>
             <a:fld id="{7F5567F1-2D95-49B6-A035-646F0D455395}" type="datetimeFigureOut">
               <a:rPr lang="it-IT" smtClean="0"/>
-              <a:t>04/10/2020</a:t>
+              <a:t>05/10/2020</a:t>
             </a:fld>
             <a:endParaRPr lang="it-IT"/>
           </a:p>
@@ -12830,8 +13180,8 @@
           </a:p>
         </p:txBody>
       </p:sp>
-      <mc:AlternateContent xmlns:mc="http://schemas.openxmlformats.org/markup-compatibility/2006">
-        <mc:Choice xmlns:a14="http://schemas.microsoft.com/office/drawing/2010/main" Requires="a14">
+      <mc:AlternateContent xmlns:mc="http://schemas.openxmlformats.org/markup-compatibility/2006" xmlns:a14="http://schemas.microsoft.com/office/drawing/2010/main">
+        <mc:Choice Requires="a14">
           <p:sp>
             <p:nvSpPr>
               <p:cNvPr id="3" name="Content Placeholder 2">
@@ -13021,7 +13371,7 @@
             </p:txBody>
           </p:sp>
         </mc:Choice>
-        <mc:Fallback>
+        <mc:Fallback xmlns="">
           <p:sp>
             <p:nvSpPr>
               <p:cNvPr id="3" name="Content Placeholder 2">
@@ -13194,6 +13544,376 @@
           <a:chExt cx="0" cy="0"/>
         </a:xfrm>
       </p:grpSpPr>
+      <p:sp>
+        <p:nvSpPr>
+          <p:cNvPr id="7" name="Rectangle 9">
+            <a:extLst>
+              <a:ext uri="{FF2B5EF4-FFF2-40B4-BE49-F238E27FC236}">
+                <a16:creationId xmlns:a16="http://schemas.microsoft.com/office/drawing/2014/main" id="{C2579DAE-C141-48DB-810E-C070C300819E}"/>
+              </a:ext>
+              <a:ext uri="{C183D7F6-B498-43B3-948B-1728B52AA6E4}">
+                <adec:decorative xmlns:adec="http://schemas.microsoft.com/office/drawing/2017/decorative" val="1"/>
+              </a:ext>
+            </a:extLst>
+          </p:cNvPr>
+          <p:cNvSpPr>
+            <a:spLocks noGrp="1" noRot="1" noChangeAspect="1" noMove="1" noResize="1" noEditPoints="1" noAdjustHandles="1" noChangeArrowheads="1" noChangeShapeType="1" noTextEdit="1"/>
+          </p:cNvSpPr>
+          <p:nvPr>
+            <p:extLst>
+              <p:ext uri="{386F3935-93C4-4BCD-93E2-E3B085C9AB24}">
+                <p16:designElem xmlns:p16="http://schemas.microsoft.com/office/powerpoint/2015/main" val="1"/>
+              </p:ext>
+            </p:extLst>
+          </p:nvPr>
+        </p:nvSpPr>
+        <p:spPr>
+          <a:xfrm>
+            <a:off x="3175" y="6400800"/>
+            <a:ext cx="12188825" cy="457200"/>
+          </a:xfrm>
+          <a:prstGeom prst="rect">
+            <a:avLst/>
+          </a:prstGeom>
+          <a:solidFill>
+            <a:schemeClr val="accent2"/>
+          </a:solidFill>
+          <a:ln>
+            <a:noFill/>
+          </a:ln>
+        </p:spPr>
+        <p:style>
+          <a:lnRef idx="2">
+            <a:schemeClr val="accent1">
+              <a:shade val="50000"/>
+            </a:schemeClr>
+          </a:lnRef>
+          <a:fillRef idx="1">
+            <a:schemeClr val="accent1"/>
+          </a:fillRef>
+          <a:effectRef idx="0">
+            <a:schemeClr val="accent1"/>
+          </a:effectRef>
+          <a:fontRef idx="minor">
+            <a:schemeClr val="lt1"/>
+          </a:fontRef>
+        </p:style>
+      </p:sp>
+      <p:sp>
+        <p:nvSpPr>
+          <p:cNvPr id="8" name="Rectangle 11">
+            <a:extLst>
+              <a:ext uri="{FF2B5EF4-FFF2-40B4-BE49-F238E27FC236}">
+                <a16:creationId xmlns:a16="http://schemas.microsoft.com/office/drawing/2014/main" id="{02FD90C3-6350-4D5B-9738-6E94EDF30F74}"/>
+              </a:ext>
+              <a:ext uri="{C183D7F6-B498-43B3-948B-1728B52AA6E4}">
+                <adec:decorative xmlns:adec="http://schemas.microsoft.com/office/drawing/2017/decorative" val="1"/>
+              </a:ext>
+            </a:extLst>
+          </p:cNvPr>
+          <p:cNvSpPr>
+            <a:spLocks noGrp="1" noRot="1" noChangeAspect="1" noMove="1" noResize="1" noEditPoints="1" noAdjustHandles="1" noChangeArrowheads="1" noChangeShapeType="1" noTextEdit="1"/>
+          </p:cNvSpPr>
+          <p:nvPr>
+            <p:extLst>
+              <p:ext uri="{386F3935-93C4-4BCD-93E2-E3B085C9AB24}">
+                <p16:designElem xmlns:p16="http://schemas.microsoft.com/office/powerpoint/2015/main" val="1"/>
+              </p:ext>
+            </p:extLst>
+          </p:nvPr>
+        </p:nvSpPr>
+        <p:spPr>
+          <a:xfrm>
+            <a:off x="15" y="6334316"/>
+            <a:ext cx="12188825" cy="64008"/>
+          </a:xfrm>
+          <a:prstGeom prst="rect">
+            <a:avLst/>
+          </a:prstGeom>
+          <a:solidFill>
+            <a:schemeClr val="accent1"/>
+          </a:solidFill>
+          <a:ln>
+            <a:noFill/>
+          </a:ln>
+        </p:spPr>
+        <p:style>
+          <a:lnRef idx="2">
+            <a:schemeClr val="accent1">
+              <a:shade val="50000"/>
+            </a:schemeClr>
+          </a:lnRef>
+          <a:fillRef idx="1">
+            <a:schemeClr val="accent1"/>
+          </a:fillRef>
+          <a:effectRef idx="0">
+            <a:schemeClr val="accent1"/>
+          </a:effectRef>
+          <a:fontRef idx="minor">
+            <a:schemeClr val="lt1"/>
+          </a:fontRef>
+        </p:style>
+      </p:sp>
+      <p:sp>
+        <p:nvSpPr>
+          <p:cNvPr id="9" name="Rectangle 13">
+            <a:extLst>
+              <a:ext uri="{FF2B5EF4-FFF2-40B4-BE49-F238E27FC236}">
+                <a16:creationId xmlns:a16="http://schemas.microsoft.com/office/drawing/2014/main" id="{41497DE5-0939-4D1D-9350-0C5E1B209C68}"/>
+              </a:ext>
+              <a:ext uri="{C183D7F6-B498-43B3-948B-1728B52AA6E4}">
+                <adec:decorative xmlns:adec="http://schemas.microsoft.com/office/drawing/2017/decorative" val="1"/>
+              </a:ext>
+            </a:extLst>
+          </p:cNvPr>
+          <p:cNvSpPr>
+            <a:spLocks noGrp="1" noRot="1" noChangeAspect="1" noMove="1" noResize="1" noEditPoints="1" noAdjustHandles="1" noChangeArrowheads="1" noChangeShapeType="1" noTextEdit="1"/>
+          </p:cNvSpPr>
+          <p:nvPr>
+            <p:extLst>
+              <p:ext uri="{386F3935-93C4-4BCD-93E2-E3B085C9AB24}">
+                <p16:designElem xmlns:p16="http://schemas.microsoft.com/office/powerpoint/2015/main" val="1"/>
+              </p:ext>
+            </p:extLst>
+          </p:nvPr>
+        </p:nvSpPr>
+        <p:spPr>
+          <a:xfrm>
+            <a:off x="0" y="0"/>
+            <a:ext cx="12192000" cy="6858000"/>
+          </a:xfrm>
+          <a:prstGeom prst="rect">
+            <a:avLst/>
+          </a:prstGeom>
+          <a:solidFill>
+            <a:schemeClr val="accent2"/>
+          </a:solidFill>
+          <a:ln>
+            <a:noFill/>
+          </a:ln>
+        </p:spPr>
+        <p:style>
+          <a:lnRef idx="2">
+            <a:schemeClr val="accent1">
+              <a:shade val="50000"/>
+            </a:schemeClr>
+          </a:lnRef>
+          <a:fillRef idx="1">
+            <a:schemeClr val="accent1"/>
+          </a:fillRef>
+          <a:effectRef idx="0">
+            <a:schemeClr val="accent1"/>
+          </a:effectRef>
+          <a:fontRef idx="minor">
+            <a:schemeClr val="lt1"/>
+          </a:fontRef>
+        </p:style>
+        <p:txBody>
+          <a:bodyPr rtlCol="0" anchor="ctr"/>
+          <a:lstStyle/>
+          <a:p>
+            <a:pPr algn="ctr"/>
+            <a:endParaRPr lang="en-US"/>
+          </a:p>
+        </p:txBody>
+      </p:sp>
+      <p:sp>
+        <p:nvSpPr>
+          <p:cNvPr id="11" name="Rectangle 15">
+            <a:extLst>
+              <a:ext uri="{FF2B5EF4-FFF2-40B4-BE49-F238E27FC236}">
+                <a16:creationId xmlns:a16="http://schemas.microsoft.com/office/drawing/2014/main" id="{5CCC70ED-6C63-4537-B7EB-51990D6C0A6F}"/>
+              </a:ext>
+              <a:ext uri="{C183D7F6-B498-43B3-948B-1728B52AA6E4}">
+                <adec:decorative xmlns:adec="http://schemas.microsoft.com/office/drawing/2017/decorative" val="1"/>
+              </a:ext>
+            </a:extLst>
+          </p:cNvPr>
+          <p:cNvSpPr>
+            <a:spLocks noGrp="1" noRot="1" noChangeAspect="1" noMove="1" noResize="1" noEditPoints="1" noAdjustHandles="1" noChangeArrowheads="1" noChangeShapeType="1" noTextEdit="1"/>
+          </p:cNvSpPr>
+          <p:nvPr>
+            <p:extLst>
+              <p:ext uri="{386F3935-93C4-4BCD-93E2-E3B085C9AB24}">
+                <p16:designElem xmlns:p16="http://schemas.microsoft.com/office/powerpoint/2015/main" val="1"/>
+              </p:ext>
+            </p:extLst>
+          </p:nvPr>
+        </p:nvSpPr>
+        <p:spPr>
+          <a:xfrm>
+            <a:off x="458724" y="457200"/>
+            <a:ext cx="11274552" cy="5943600"/>
+          </a:xfrm>
+          <a:prstGeom prst="rect">
+            <a:avLst/>
+          </a:prstGeom>
+          <a:ln>
+            <a:noFill/>
+          </a:ln>
+        </p:spPr>
+        <p:style>
+          <a:lnRef idx="2">
+            <a:schemeClr val="accent1">
+              <a:shade val="50000"/>
+            </a:schemeClr>
+          </a:lnRef>
+          <a:fillRef idx="1">
+            <a:schemeClr val="accent1"/>
+          </a:fillRef>
+          <a:effectRef idx="0">
+            <a:schemeClr val="accent1"/>
+          </a:effectRef>
+          <a:fontRef idx="minor">
+            <a:schemeClr val="lt1"/>
+          </a:fontRef>
+        </p:style>
+        <p:txBody>
+          <a:bodyPr rtlCol="0" anchor="ctr"/>
+          <a:lstStyle/>
+          <a:p>
+            <a:pPr algn="ctr"/>
+            <a:endParaRPr lang="en-US"/>
+          </a:p>
+        </p:txBody>
+      </p:sp>
+      <p:sp>
+        <p:nvSpPr>
+          <p:cNvPr id="13" name="Rectangle 17">
+            <a:extLst>
+              <a:ext uri="{FF2B5EF4-FFF2-40B4-BE49-F238E27FC236}">
+                <a16:creationId xmlns:a16="http://schemas.microsoft.com/office/drawing/2014/main" id="{B76E24C1-2968-40DC-A36E-F6B85F0F0752}"/>
+              </a:ext>
+              <a:ext uri="{C183D7F6-B498-43B3-948B-1728B52AA6E4}">
+                <adec:decorative xmlns:adec="http://schemas.microsoft.com/office/drawing/2017/decorative" val="1"/>
+              </a:ext>
+            </a:extLst>
+          </p:cNvPr>
+          <p:cNvSpPr>
+            <a:spLocks noGrp="1" noRot="1" noChangeAspect="1" noMove="1" noResize="1" noEditPoints="1" noAdjustHandles="1" noChangeArrowheads="1" noChangeShapeType="1" noTextEdit="1"/>
+          </p:cNvSpPr>
+          <p:nvPr>
+            <p:extLst>
+              <p:ext uri="{386F3935-93C4-4BCD-93E2-E3B085C9AB24}">
+                <p16:designElem xmlns:p16="http://schemas.microsoft.com/office/powerpoint/2015/main" val="1"/>
+              </p:ext>
+            </p:extLst>
+          </p:nvPr>
+        </p:nvSpPr>
+        <p:spPr>
+          <a:xfrm>
+            <a:off x="522732" y="521208"/>
+            <a:ext cx="11146536" cy="5815584"/>
+          </a:xfrm>
+          <a:prstGeom prst="rect">
+            <a:avLst/>
+          </a:prstGeom>
+          <a:solidFill>
+            <a:srgbClr val="FFFFFF"/>
+          </a:solidFill>
+          <a:ln>
+            <a:noFill/>
+          </a:ln>
+        </p:spPr>
+        <p:style>
+          <a:lnRef idx="2">
+            <a:schemeClr val="accent1">
+              <a:shade val="50000"/>
+            </a:schemeClr>
+          </a:lnRef>
+          <a:fillRef idx="1">
+            <a:schemeClr val="accent1"/>
+          </a:fillRef>
+          <a:effectRef idx="0">
+            <a:schemeClr val="accent1"/>
+          </a:effectRef>
+          <a:fontRef idx="minor">
+            <a:schemeClr val="lt1"/>
+          </a:fontRef>
+        </p:style>
+        <p:txBody>
+          <a:bodyPr rtlCol="0" anchor="ctr"/>
+          <a:lstStyle/>
+          <a:p>
+            <a:pPr algn="ctr"/>
+            <a:endParaRPr lang="en-US"/>
+          </a:p>
+        </p:txBody>
+      </p:sp>
+      <p:pic>
+        <p:nvPicPr>
+          <p:cNvPr id="5" name="Picture 4" descr="Chart, line chart&#10;&#10;Description automatically generated">
+            <a:extLst>
+              <a:ext uri="{FF2B5EF4-FFF2-40B4-BE49-F238E27FC236}">
+                <a16:creationId xmlns:a16="http://schemas.microsoft.com/office/drawing/2014/main" id="{43611857-6A72-42AC-B666-B76266E39A84}"/>
+              </a:ext>
+            </a:extLst>
+          </p:cNvPr>
+          <p:cNvPicPr>
+            <a:picLocks noChangeAspect="1"/>
+          </p:cNvPicPr>
+          <p:nvPr/>
+        </p:nvPicPr>
+        <p:blipFill>
+          <a:blip r:embed="rId2">
+            <a:extLst>
+              <a:ext uri="{28A0092B-C50C-407E-A947-70E740481C1C}">
+                <a14:useLocalDpi xmlns:a14="http://schemas.microsoft.com/office/drawing/2010/main" val="0"/>
+              </a:ext>
+            </a:extLst>
+          </a:blip>
+          <a:stretch>
+            <a:fillRect/>
+          </a:stretch>
+        </p:blipFill>
+        <p:spPr>
+          <a:xfrm>
+            <a:off x="2752183" y="905933"/>
+            <a:ext cx="6719637" cy="5039728"/>
+          </a:xfrm>
+          <a:prstGeom prst="rect">
+            <a:avLst/>
+          </a:prstGeom>
+        </p:spPr>
+      </p:pic>
+    </p:spTree>
+    <p:extLst>
+      <p:ext uri="{BB962C8B-B14F-4D97-AF65-F5344CB8AC3E}">
+        <p14:creationId xmlns:p14="http://schemas.microsoft.com/office/powerpoint/2010/main" val="2909672955"/>
+      </p:ext>
+    </p:extLst>
+  </p:cSld>
+  <p:clrMapOvr>
+    <a:masterClrMapping/>
+  </p:clrMapOvr>
+</p:sld>
+</file>
+
+<file path=ppt/slides/slide16.xml><?xml version="1.0" encoding="utf-8"?>
+<p:sld xmlns:a="http://schemas.openxmlformats.org/drawingml/2006/main" xmlns:r="http://schemas.openxmlformats.org/officeDocument/2006/relationships" xmlns:p="http://schemas.openxmlformats.org/presentationml/2006/main">
+  <p:cSld>
+    <p:bg>
+      <p:bgPr>
+        <a:solidFill>
+          <a:schemeClr val="bg1"/>
+        </a:solidFill>
+        <a:effectLst/>
+      </p:bgPr>
+    </p:bg>
+    <p:spTree>
+      <p:nvGrpSpPr>
+        <p:cNvPr id="1" name=""/>
+        <p:cNvGrpSpPr/>
+        <p:nvPr/>
+      </p:nvGrpSpPr>
+      <p:grpSpPr>
+        <a:xfrm>
+          <a:off x="0" y="0"/>
+          <a:ext cx="0" cy="0"/>
+          <a:chOff x="0" y="0"/>
+          <a:chExt cx="0" cy="0"/>
+        </a:xfrm>
+      </p:grpSpPr>
       <p:sp useBgFill="1">
         <p:nvSpPr>
           <p:cNvPr id="10" name="Rectangle 9">
@@ -13530,7 +14250,7 @@
 </p:sld>
 </file>
 
-<file path=ppt/slides/slide16.xml><?xml version="1.0" encoding="utf-8"?>
+<file path=ppt/slides/slide17.xml><?xml version="1.0" encoding="utf-8"?>
 <p:sld xmlns:a="http://schemas.openxmlformats.org/drawingml/2006/main" xmlns:r="http://schemas.openxmlformats.org/officeDocument/2006/relationships" xmlns:p="http://schemas.openxmlformats.org/presentationml/2006/main">
   <p:cSld>
     <p:spTree>
@@ -13937,7 +14657,7 @@
 </p:sld>
 </file>
 
-<file path=ppt/slides/slide17.xml><?xml version="1.0" encoding="utf-8"?>
+<file path=ppt/slides/slide18.xml><?xml version="1.0" encoding="utf-8"?>
 <p:sld xmlns:a="http://schemas.openxmlformats.org/drawingml/2006/main" xmlns:r="http://schemas.openxmlformats.org/officeDocument/2006/relationships" xmlns:p="http://schemas.openxmlformats.org/presentationml/2006/main">
   <p:cSld>
     <p:spTree>
@@ -14174,7 +14894,7 @@
 </p:sld>
 </file>
 
-<file path=ppt/slides/slide18.xml><?xml version="1.0" encoding="utf-8"?>
+<file path=ppt/slides/slide19.xml><?xml version="1.0" encoding="utf-8"?>
 <p:sld xmlns:a="http://schemas.openxmlformats.org/drawingml/2006/main" xmlns:r="http://schemas.openxmlformats.org/officeDocument/2006/relationships" xmlns:p="http://schemas.openxmlformats.org/presentationml/2006/main">
   <p:cSld>
     <p:spTree>
@@ -14357,219 +15077,6 @@
     <p:extLst>
       <p:ext uri="{BB962C8B-B14F-4D97-AF65-F5344CB8AC3E}">
         <p14:creationId xmlns:p14="http://schemas.microsoft.com/office/powerpoint/2010/main" val="895853198"/>
-      </p:ext>
-    </p:extLst>
-  </p:cSld>
-  <p:clrMapOvr>
-    <a:masterClrMapping/>
-  </p:clrMapOvr>
-</p:sld>
-</file>
-
-<file path=ppt/slides/slide19.xml><?xml version="1.0" encoding="utf-8"?>
-<p:sld xmlns:a="http://schemas.openxmlformats.org/drawingml/2006/main" xmlns:r="http://schemas.openxmlformats.org/officeDocument/2006/relationships" xmlns:p="http://schemas.openxmlformats.org/presentationml/2006/main">
-  <p:cSld>
-    <p:spTree>
-      <p:nvGrpSpPr>
-        <p:cNvPr id="1" name=""/>
-        <p:cNvGrpSpPr/>
-        <p:nvPr/>
-      </p:nvGrpSpPr>
-      <p:grpSpPr>
-        <a:xfrm>
-          <a:off x="0" y="0"/>
-          <a:ext cx="0" cy="0"/>
-          <a:chOff x="0" y="0"/>
-          <a:chExt cx="0" cy="0"/>
-        </a:xfrm>
-      </p:grpSpPr>
-      <p:sp>
-        <p:nvSpPr>
-          <p:cNvPr id="2" name="Title 1">
-            <a:extLst>
-              <a:ext uri="{FF2B5EF4-FFF2-40B4-BE49-F238E27FC236}">
-                <a16:creationId xmlns:a16="http://schemas.microsoft.com/office/drawing/2014/main" id="{805A321E-DEBE-47CF-9201-D09B27E5C0C5}"/>
-              </a:ext>
-            </a:extLst>
-          </p:cNvPr>
-          <p:cNvSpPr>
-            <a:spLocks noGrp="1"/>
-          </p:cNvSpPr>
-          <p:nvPr>
-            <p:ph type="title"/>
-          </p:nvPr>
-        </p:nvSpPr>
-        <p:spPr/>
-        <p:txBody>
-          <a:bodyPr/>
-          <a:lstStyle/>
-          <a:p>
-            <a:r>
-              <a:rPr lang="es-CO" dirty="0" err="1"/>
-              <a:t>References</a:t>
-            </a:r>
-            <a:endParaRPr lang="it-IT" dirty="0"/>
-          </a:p>
-        </p:txBody>
-      </p:sp>
-      <p:sp>
-        <p:nvSpPr>
-          <p:cNvPr id="3" name="Content Placeholder 2">
-            <a:extLst>
-              <a:ext uri="{FF2B5EF4-FFF2-40B4-BE49-F238E27FC236}">
-                <a16:creationId xmlns:a16="http://schemas.microsoft.com/office/drawing/2014/main" id="{32D87960-BECB-4B2F-A126-82AB8A1351B9}"/>
-              </a:ext>
-            </a:extLst>
-          </p:cNvPr>
-          <p:cNvSpPr>
-            <a:spLocks noGrp="1"/>
-          </p:cNvSpPr>
-          <p:nvPr>
-            <p:ph idx="1"/>
-          </p:nvPr>
-        </p:nvSpPr>
-        <p:spPr/>
-        <p:txBody>
-          <a:bodyPr/>
-          <a:lstStyle/>
-          <a:p>
-            <a:r>
-              <a:rPr lang="es-CO" dirty="0"/>
-              <a:t>[1]. </a:t>
-            </a:r>
-            <a:r>
-              <a:rPr lang="en-US" dirty="0">
-                <a:solidFill>
-                  <a:srgbClr val="000000"/>
-                </a:solidFill>
-              </a:rPr>
-              <a:t>C. E. </a:t>
-            </a:r>
-            <a:r>
-              <a:rPr lang="en-US" dirty="0" err="1">
-                <a:solidFill>
-                  <a:srgbClr val="000000"/>
-                </a:solidFill>
-              </a:rPr>
-              <a:t>Leiserson</a:t>
-            </a:r>
-            <a:r>
-              <a:rPr lang="en-US" dirty="0">
-                <a:solidFill>
-                  <a:srgbClr val="000000"/>
-                </a:solidFill>
-              </a:rPr>
-              <a:t> and J. B. Saxe, "Retiming Synchronous Circuitry", Digital Systems Research Center, Report 18, August 20, 1986.</a:t>
-            </a:r>
-          </a:p>
-          <a:p>
-            <a:r>
-              <a:rPr lang="it-IT" dirty="0">
-                <a:solidFill>
-                  <a:schemeClr val="tx1"/>
-                </a:solidFill>
-              </a:rPr>
-              <a:t>[2]. Graph Tool Official Documentation: </a:t>
-            </a:r>
-            <a:r>
-              <a:rPr lang="it-IT" dirty="0">
-                <a:hlinkClick r:id="rId2"/>
-              </a:rPr>
-              <a:t>https://graph-tool.skewed.de/</a:t>
-            </a:r>
-            <a:endParaRPr lang="it-IT" dirty="0"/>
-          </a:p>
-          <a:p>
-            <a:r>
-              <a:rPr lang="it-IT" dirty="0">
-                <a:solidFill>
-                  <a:schemeClr val="tx1"/>
-                </a:solidFill>
-              </a:rPr>
-              <a:t>[3]. </a:t>
-            </a:r>
-            <a:r>
-              <a:rPr lang="en-US" dirty="0">
-                <a:solidFill>
-                  <a:schemeClr val="tx1"/>
-                </a:solidFill>
-              </a:rPr>
-              <a:t>Profiling and Timing Code: </a:t>
-            </a:r>
-            <a:r>
-              <a:rPr lang="en-US" dirty="0">
-                <a:solidFill>
-                  <a:schemeClr val="tx1"/>
-                </a:solidFill>
-                <a:hlinkClick r:id="rId3"/>
-              </a:rPr>
-              <a:t>https://jakevdp.github.io/PythonDataScienceHandbook/01.07-timing-and-profiling.html</a:t>
-            </a:r>
-            <a:endParaRPr lang="en-US" dirty="0">
-              <a:solidFill>
-                <a:schemeClr val="tx1"/>
-              </a:solidFill>
-            </a:endParaRPr>
-          </a:p>
-          <a:p>
-            <a:r>
-              <a:rPr lang="en-US" dirty="0">
-                <a:solidFill>
-                  <a:schemeClr val="tx1"/>
-                </a:solidFill>
-              </a:rPr>
-              <a:t>[4]. </a:t>
-            </a:r>
-            <a:r>
-              <a:rPr lang="en-US" dirty="0" err="1">
-                <a:solidFill>
-                  <a:schemeClr val="tx1"/>
-                </a:solidFill>
-              </a:rPr>
-              <a:t>SnakeViz</a:t>
-            </a:r>
-            <a:r>
-              <a:rPr lang="en-US" dirty="0">
-                <a:solidFill>
-                  <a:schemeClr val="tx1"/>
-                </a:solidFill>
-              </a:rPr>
-              <a:t>: </a:t>
-            </a:r>
-            <a:r>
-              <a:rPr lang="en-US" dirty="0">
-                <a:solidFill>
-                  <a:schemeClr val="tx1"/>
-                </a:solidFill>
-                <a:hlinkClick r:id="rId4"/>
-              </a:rPr>
-              <a:t>https://jiffyclub.github.io/snakeviz/</a:t>
-            </a:r>
-            <a:endParaRPr lang="en-US" dirty="0">
-              <a:solidFill>
-                <a:schemeClr val="tx1"/>
-              </a:solidFill>
-            </a:endParaRPr>
-          </a:p>
-          <a:p>
-            <a:endParaRPr lang="it-IT" dirty="0">
-              <a:solidFill>
-                <a:schemeClr val="tx1"/>
-              </a:solidFill>
-            </a:endParaRPr>
-          </a:p>
-          <a:p>
-            <a:pPr marL="0" indent="0">
-              <a:buNone/>
-            </a:pPr>
-            <a:endParaRPr lang="it-IT" dirty="0"/>
-          </a:p>
-        </p:txBody>
-      </p:sp>
-    </p:spTree>
-    <p:extLst>
-      <p:ext uri="{BB962C8B-B14F-4D97-AF65-F5344CB8AC3E}">
-        <p14:creationId xmlns:p14="http://schemas.microsoft.com/office/powerpoint/2010/main" val="803622926"/>
       </p:ext>
     </p:extLst>
   </p:cSld>
@@ -14716,6 +15223,219 @@
     <p:extLst>
       <p:ext uri="{BB962C8B-B14F-4D97-AF65-F5344CB8AC3E}">
         <p14:creationId xmlns:p14="http://schemas.microsoft.com/office/powerpoint/2010/main" val="1725974181"/>
+      </p:ext>
+    </p:extLst>
+  </p:cSld>
+  <p:clrMapOvr>
+    <a:masterClrMapping/>
+  </p:clrMapOvr>
+</p:sld>
+</file>
+
+<file path=ppt/slides/slide20.xml><?xml version="1.0" encoding="utf-8"?>
+<p:sld xmlns:a="http://schemas.openxmlformats.org/drawingml/2006/main" xmlns:r="http://schemas.openxmlformats.org/officeDocument/2006/relationships" xmlns:p="http://schemas.openxmlformats.org/presentationml/2006/main">
+  <p:cSld>
+    <p:spTree>
+      <p:nvGrpSpPr>
+        <p:cNvPr id="1" name=""/>
+        <p:cNvGrpSpPr/>
+        <p:nvPr/>
+      </p:nvGrpSpPr>
+      <p:grpSpPr>
+        <a:xfrm>
+          <a:off x="0" y="0"/>
+          <a:ext cx="0" cy="0"/>
+          <a:chOff x="0" y="0"/>
+          <a:chExt cx="0" cy="0"/>
+        </a:xfrm>
+      </p:grpSpPr>
+      <p:sp>
+        <p:nvSpPr>
+          <p:cNvPr id="2" name="Title 1">
+            <a:extLst>
+              <a:ext uri="{FF2B5EF4-FFF2-40B4-BE49-F238E27FC236}">
+                <a16:creationId xmlns:a16="http://schemas.microsoft.com/office/drawing/2014/main" id="{805A321E-DEBE-47CF-9201-D09B27E5C0C5}"/>
+              </a:ext>
+            </a:extLst>
+          </p:cNvPr>
+          <p:cNvSpPr>
+            <a:spLocks noGrp="1"/>
+          </p:cNvSpPr>
+          <p:nvPr>
+            <p:ph type="title"/>
+          </p:nvPr>
+        </p:nvSpPr>
+        <p:spPr/>
+        <p:txBody>
+          <a:bodyPr/>
+          <a:lstStyle/>
+          <a:p>
+            <a:r>
+              <a:rPr lang="es-CO" dirty="0" err="1"/>
+              <a:t>References</a:t>
+            </a:r>
+            <a:endParaRPr lang="it-IT" dirty="0"/>
+          </a:p>
+        </p:txBody>
+      </p:sp>
+      <p:sp>
+        <p:nvSpPr>
+          <p:cNvPr id="3" name="Content Placeholder 2">
+            <a:extLst>
+              <a:ext uri="{FF2B5EF4-FFF2-40B4-BE49-F238E27FC236}">
+                <a16:creationId xmlns:a16="http://schemas.microsoft.com/office/drawing/2014/main" id="{32D87960-BECB-4B2F-A126-82AB8A1351B9}"/>
+              </a:ext>
+            </a:extLst>
+          </p:cNvPr>
+          <p:cNvSpPr>
+            <a:spLocks noGrp="1"/>
+          </p:cNvSpPr>
+          <p:nvPr>
+            <p:ph idx="1"/>
+          </p:nvPr>
+        </p:nvSpPr>
+        <p:spPr/>
+        <p:txBody>
+          <a:bodyPr/>
+          <a:lstStyle/>
+          <a:p>
+            <a:r>
+              <a:rPr lang="es-CO" dirty="0"/>
+              <a:t>[1]. </a:t>
+            </a:r>
+            <a:r>
+              <a:rPr lang="en-US" dirty="0">
+                <a:solidFill>
+                  <a:srgbClr val="000000"/>
+                </a:solidFill>
+              </a:rPr>
+              <a:t>C. E. </a:t>
+            </a:r>
+            <a:r>
+              <a:rPr lang="en-US" dirty="0" err="1">
+                <a:solidFill>
+                  <a:srgbClr val="000000"/>
+                </a:solidFill>
+              </a:rPr>
+              <a:t>Leiserson</a:t>
+            </a:r>
+            <a:r>
+              <a:rPr lang="en-US" dirty="0">
+                <a:solidFill>
+                  <a:srgbClr val="000000"/>
+                </a:solidFill>
+              </a:rPr>
+              <a:t> and J. B. Saxe, "Retiming Synchronous Circuitry", Digital Systems Research Center, Report 18, August 20, 1986.</a:t>
+            </a:r>
+          </a:p>
+          <a:p>
+            <a:r>
+              <a:rPr lang="it-IT" dirty="0">
+                <a:solidFill>
+                  <a:schemeClr val="tx1"/>
+                </a:solidFill>
+              </a:rPr>
+              <a:t>[2]. Graph Tool Official Documentation: </a:t>
+            </a:r>
+            <a:r>
+              <a:rPr lang="it-IT" dirty="0">
+                <a:hlinkClick r:id="rId2"/>
+              </a:rPr>
+              <a:t>https://graph-tool.skewed.de/</a:t>
+            </a:r>
+            <a:endParaRPr lang="it-IT" dirty="0"/>
+          </a:p>
+          <a:p>
+            <a:r>
+              <a:rPr lang="it-IT" dirty="0">
+                <a:solidFill>
+                  <a:schemeClr val="tx1"/>
+                </a:solidFill>
+              </a:rPr>
+              <a:t>[3]. </a:t>
+            </a:r>
+            <a:r>
+              <a:rPr lang="en-US" dirty="0">
+                <a:solidFill>
+                  <a:schemeClr val="tx1"/>
+                </a:solidFill>
+              </a:rPr>
+              <a:t>Profiling and Timing Code: </a:t>
+            </a:r>
+            <a:r>
+              <a:rPr lang="en-US" dirty="0">
+                <a:solidFill>
+                  <a:schemeClr val="tx1"/>
+                </a:solidFill>
+                <a:hlinkClick r:id="rId3"/>
+              </a:rPr>
+              <a:t>https://jakevdp.github.io/PythonDataScienceHandbook/01.07-timing-and-profiling.html</a:t>
+            </a:r>
+            <a:endParaRPr lang="en-US" dirty="0">
+              <a:solidFill>
+                <a:schemeClr val="tx1"/>
+              </a:solidFill>
+            </a:endParaRPr>
+          </a:p>
+          <a:p>
+            <a:r>
+              <a:rPr lang="en-US" dirty="0">
+                <a:solidFill>
+                  <a:schemeClr val="tx1"/>
+                </a:solidFill>
+              </a:rPr>
+              <a:t>[4]. </a:t>
+            </a:r>
+            <a:r>
+              <a:rPr lang="en-US" dirty="0" err="1">
+                <a:solidFill>
+                  <a:schemeClr val="tx1"/>
+                </a:solidFill>
+              </a:rPr>
+              <a:t>SnakeViz</a:t>
+            </a:r>
+            <a:r>
+              <a:rPr lang="en-US" dirty="0">
+                <a:solidFill>
+                  <a:schemeClr val="tx1"/>
+                </a:solidFill>
+              </a:rPr>
+              <a:t>: </a:t>
+            </a:r>
+            <a:r>
+              <a:rPr lang="en-US" dirty="0">
+                <a:solidFill>
+                  <a:schemeClr val="tx1"/>
+                </a:solidFill>
+                <a:hlinkClick r:id="rId4"/>
+              </a:rPr>
+              <a:t>https://jiffyclub.github.io/snakeviz/</a:t>
+            </a:r>
+            <a:endParaRPr lang="en-US" dirty="0">
+              <a:solidFill>
+                <a:schemeClr val="tx1"/>
+              </a:solidFill>
+            </a:endParaRPr>
+          </a:p>
+          <a:p>
+            <a:endParaRPr lang="it-IT" dirty="0">
+              <a:solidFill>
+                <a:schemeClr val="tx1"/>
+              </a:solidFill>
+            </a:endParaRPr>
+          </a:p>
+          <a:p>
+            <a:pPr marL="0" indent="0">
+              <a:buNone/>
+            </a:pPr>
+            <a:endParaRPr lang="it-IT" dirty="0"/>
+          </a:p>
+        </p:txBody>
+      </p:sp>
+    </p:spTree>
+    <p:extLst>
+      <p:ext uri="{BB962C8B-B14F-4D97-AF65-F5344CB8AC3E}">
+        <p14:creationId xmlns:p14="http://schemas.microsoft.com/office/powerpoint/2010/main" val="803622926"/>
       </p:ext>
     </p:extLst>
   </p:cSld>
@@ -18091,8 +18811,8 @@
           </a:p>
         </p:txBody>
       </p:sp>
-      <mc:AlternateContent xmlns:mc="http://schemas.openxmlformats.org/markup-compatibility/2006">
-        <mc:Choice xmlns:a14="http://schemas.microsoft.com/office/drawing/2010/main" Requires="a14">
+      <mc:AlternateContent xmlns:mc="http://schemas.openxmlformats.org/markup-compatibility/2006" xmlns:a14="http://schemas.microsoft.com/office/drawing/2010/main">
+        <mc:Choice Requires="a14">
           <p:graphicFrame>
             <p:nvGraphicFramePr>
               <p:cNvPr id="8" name="Table 8">
@@ -19128,7 +19848,7 @@
             </a:graphic>
           </p:graphicFrame>
         </mc:Choice>
-        <mc:Fallback>
+        <mc:Fallback xmlns="">
           <p:graphicFrame>
             <p:nvGraphicFramePr>
               <p:cNvPr id="8" name="Table 8">

</xml_diff>

<commit_message>
Profilers and Presentation Updated
</commit_message>
<xml_diff>
--- a/Retiming10670388_ProjectPresentation.pptx
+++ b/Retiming10670388_ProjectPresentation.pptx
@@ -5,7 +5,7 @@
     <p:sldMasterId id="2147483660" r:id="rId1"/>
   </p:sldMasterIdLst>
   <p:notesMasterIdLst>
-    <p:notesMasterId r:id="rId22"/>
+    <p:notesMasterId r:id="rId23"/>
   </p:notesMasterIdLst>
   <p:sldIdLst>
     <p:sldId id="256" r:id="rId2"/>
@@ -24,10 +24,11 @@
     <p:sldId id="274" r:id="rId15"/>
     <p:sldId id="277" r:id="rId16"/>
     <p:sldId id="275" r:id="rId17"/>
-    <p:sldId id="269" r:id="rId18"/>
-    <p:sldId id="270" r:id="rId19"/>
-    <p:sldId id="271" r:id="rId20"/>
-    <p:sldId id="259" r:id="rId21"/>
+    <p:sldId id="278" r:id="rId18"/>
+    <p:sldId id="269" r:id="rId19"/>
+    <p:sldId id="270" r:id="rId20"/>
+    <p:sldId id="271" r:id="rId21"/>
+    <p:sldId id="259" r:id="rId22"/>
   </p:sldIdLst>
   <p:sldSz cx="12192000" cy="6858000"/>
   <p:notesSz cx="6858000" cy="9144000"/>
@@ -149,7 +150,7 @@
 <file path=ppt/revisionInfo.xml><?xml version="1.0" encoding="utf-8"?>
 <p1510:revInfo xmlns:a="http://schemas.openxmlformats.org/drawingml/2006/main" xmlns:r="http://schemas.openxmlformats.org/officeDocument/2006/relationships" xmlns:p1510="http://schemas.microsoft.com/office/powerpoint/2015/10/main">
   <p1510:revLst>
-    <p1510:client id="{CDAB1E75-1FDE-4F40-80F3-634554960AF9}" v="252" dt="2020-10-05T00:04:45.578"/>
+    <p1510:client id="{CDAB1E75-1FDE-4F40-80F3-634554960AF9}" v="257" dt="2020-10-05T00:36:51.962"/>
   </p1510:revLst>
 </p1510:revInfo>
 </file>
@@ -159,7 +160,7 @@
   <pc:docChgLst>
     <pc:chgData name="Samuel Polo" userId="c75c2d6ea6afc445" providerId="LiveId" clId="{CDAB1E75-1FDE-4F40-80F3-634554960AF9}"/>
     <pc:docChg chg="undo custSel mod addSld delSld modSld">
-      <pc:chgData name="Samuel Polo" userId="c75c2d6ea6afc445" providerId="LiveId" clId="{CDAB1E75-1FDE-4F40-80F3-634554960AF9}" dt="2020-10-05T00:04:58.245" v="3705" actId="26606"/>
+      <pc:chgData name="Samuel Polo" userId="c75c2d6ea6afc445" providerId="LiveId" clId="{CDAB1E75-1FDE-4F40-80F3-634554960AF9}" dt="2020-10-05T00:40:50.943" v="3847" actId="20577"/>
       <pc:docMkLst>
         <pc:docMk/>
       </pc:docMkLst>
@@ -578,7 +579,7 @@
         </pc:spChg>
       </pc:sldChg>
       <pc:sldChg chg="addSp modSp new mod setBg">
-        <pc:chgData name="Samuel Polo" userId="c75c2d6ea6afc445" providerId="LiveId" clId="{CDAB1E75-1FDE-4F40-80F3-634554960AF9}" dt="2020-10-04T17:13:47.093" v="3478" actId="20577"/>
+        <pc:chgData name="Samuel Polo" userId="c75c2d6ea6afc445" providerId="LiveId" clId="{CDAB1E75-1FDE-4F40-80F3-634554960AF9}" dt="2020-10-05T00:36:51.961" v="3812" actId="255"/>
         <pc:sldMkLst>
           <pc:docMk/>
           <pc:sldMk cId="1284458424" sldId="274"/>
@@ -592,7 +593,7 @@
           </ac:spMkLst>
         </pc:spChg>
         <pc:spChg chg="mod">
-          <ac:chgData name="Samuel Polo" userId="c75c2d6ea6afc445" providerId="LiveId" clId="{CDAB1E75-1FDE-4F40-80F3-634554960AF9}" dt="2020-10-04T17:13:47.093" v="3478" actId="20577"/>
+          <ac:chgData name="Samuel Polo" userId="c75c2d6ea6afc445" providerId="LiveId" clId="{CDAB1E75-1FDE-4F40-80F3-634554960AF9}" dt="2020-10-05T00:36:51.961" v="3812" actId="255"/>
           <ac:spMkLst>
             <pc:docMk/>
             <pc:sldMk cId="1284458424" sldId="274"/>
@@ -640,7 +641,7 @@
         </pc:sldMkLst>
       </pc:sldChg>
       <pc:sldChg chg="addSp modSp new mod setBg">
-        <pc:chgData name="Samuel Polo" userId="c75c2d6ea6afc445" providerId="LiveId" clId="{CDAB1E75-1FDE-4F40-80F3-634554960AF9}" dt="2020-10-04T17:31:19.198" v="3660" actId="20577"/>
+        <pc:chgData name="Samuel Polo" userId="c75c2d6ea6afc445" providerId="LiveId" clId="{CDAB1E75-1FDE-4F40-80F3-634554960AF9}" dt="2020-10-05T00:37:13.226" v="3816" actId="1076"/>
         <pc:sldMkLst>
           <pc:docMk/>
           <pc:sldMk cId="214222533" sldId="275"/>
@@ -654,7 +655,7 @@
           </ac:spMkLst>
         </pc:spChg>
         <pc:spChg chg="mod">
-          <ac:chgData name="Samuel Polo" userId="c75c2d6ea6afc445" providerId="LiveId" clId="{CDAB1E75-1FDE-4F40-80F3-634554960AF9}" dt="2020-10-04T17:31:19.198" v="3660" actId="20577"/>
+          <ac:chgData name="Samuel Polo" userId="c75c2d6ea6afc445" providerId="LiveId" clId="{CDAB1E75-1FDE-4F40-80F3-634554960AF9}" dt="2020-10-05T00:37:13.226" v="3816" actId="1076"/>
           <ac:spMkLst>
             <pc:docMk/>
             <pc:sldMk cId="214222533" sldId="275"/>
@@ -1304,6 +1305,69 @@
             <ac:cxnSpMk id="46" creationId="{04733B62-1719-4677-A612-CA0AC0AD7482}"/>
           </ac:cxnSpMkLst>
         </pc:cxnChg>
+      </pc:sldChg>
+      <pc:sldChg chg="addSp delSp modSp new mod setBg">
+        <pc:chgData name="Samuel Polo" userId="c75c2d6ea6afc445" providerId="LiveId" clId="{CDAB1E75-1FDE-4F40-80F3-634554960AF9}" dt="2020-10-05T00:40:50.943" v="3847" actId="20577"/>
+        <pc:sldMkLst>
+          <pc:docMk/>
+          <pc:sldMk cId="2840224508" sldId="278"/>
+        </pc:sldMkLst>
+        <pc:spChg chg="mod">
+          <ac:chgData name="Samuel Polo" userId="c75c2d6ea6afc445" providerId="LiveId" clId="{CDAB1E75-1FDE-4F40-80F3-634554960AF9}" dt="2020-10-05T00:36:24.657" v="3808" actId="14100"/>
+          <ac:spMkLst>
+            <pc:docMk/>
+            <pc:sldMk cId="2840224508" sldId="278"/>
+            <ac:spMk id="2" creationId="{6CAB4602-68C4-4C11-A779-70DB4387CA5A}"/>
+          </ac:spMkLst>
+        </pc:spChg>
+        <pc:spChg chg="add del mod">
+          <ac:chgData name="Samuel Polo" userId="c75c2d6ea6afc445" providerId="LiveId" clId="{CDAB1E75-1FDE-4F40-80F3-634554960AF9}" dt="2020-10-05T00:40:50.943" v="3847" actId="20577"/>
+          <ac:spMkLst>
+            <pc:docMk/>
+            <pc:sldMk cId="2840224508" sldId="278"/>
+            <ac:spMk id="3" creationId="{287D0903-71D6-4943-89AD-87DB63B475BB}"/>
+          </ac:spMkLst>
+        </pc:spChg>
+        <pc:spChg chg="add">
+          <ac:chgData name="Samuel Polo" userId="c75c2d6ea6afc445" providerId="LiveId" clId="{CDAB1E75-1FDE-4F40-80F3-634554960AF9}" dt="2020-10-05T00:36:04.770" v="3788" actId="26606"/>
+          <ac:spMkLst>
+            <pc:docMk/>
+            <pc:sldMk cId="2840224508" sldId="278"/>
+            <ac:spMk id="12" creationId="{44CC594A-A820-450F-B363-C19201FCFEC6}"/>
+          </ac:spMkLst>
+        </pc:spChg>
+        <pc:spChg chg="add">
+          <ac:chgData name="Samuel Polo" userId="c75c2d6ea6afc445" providerId="LiveId" clId="{CDAB1E75-1FDE-4F40-80F3-634554960AF9}" dt="2020-10-05T00:36:04.770" v="3788" actId="26606"/>
+          <ac:spMkLst>
+            <pc:docMk/>
+            <pc:sldMk cId="2840224508" sldId="278"/>
+            <ac:spMk id="14" creationId="{59FAB3DA-E9ED-4574-ABCC-378BC0FF1BBC}"/>
+          </ac:spMkLst>
+        </pc:spChg>
+        <pc:spChg chg="add">
+          <ac:chgData name="Samuel Polo" userId="c75c2d6ea6afc445" providerId="LiveId" clId="{CDAB1E75-1FDE-4F40-80F3-634554960AF9}" dt="2020-10-05T00:36:04.770" v="3788" actId="26606"/>
+          <ac:spMkLst>
+            <pc:docMk/>
+            <pc:sldMk cId="2840224508" sldId="278"/>
+            <ac:spMk id="16" creationId="{53B8D6B0-55D6-48DC-86D8-FD95D5F118AB}"/>
+          </ac:spMkLst>
+        </pc:spChg>
+        <pc:picChg chg="add del mod">
+          <ac:chgData name="Samuel Polo" userId="c75c2d6ea6afc445" providerId="LiveId" clId="{CDAB1E75-1FDE-4F40-80F3-634554960AF9}" dt="2020-10-05T00:35:38.777" v="3711"/>
+          <ac:picMkLst>
+            <pc:docMk/>
+            <pc:sldMk cId="2840224508" sldId="278"/>
+            <ac:picMk id="5" creationId="{C4BAEBB1-C64D-4924-BF33-4DA12DFD98C2}"/>
+          </ac:picMkLst>
+        </pc:picChg>
+        <pc:picChg chg="add mod">
+          <ac:chgData name="Samuel Polo" userId="c75c2d6ea6afc445" providerId="LiveId" clId="{CDAB1E75-1FDE-4F40-80F3-634554960AF9}" dt="2020-10-05T00:36:04.770" v="3788" actId="26606"/>
+          <ac:picMkLst>
+            <pc:docMk/>
+            <pc:sldMk cId="2840224508" sldId="278"/>
+            <ac:picMk id="7" creationId="{723AAA43-9B31-439B-AD08-E8DE08C708B7}"/>
+          </ac:picMkLst>
+        </pc:picChg>
       </pc:sldChg>
       <pc:sldChg chg="addSp delSp modSp add del mod setBg delDesignElem">
         <pc:chgData name="Samuel Polo" userId="c75c2d6ea6afc445" providerId="LiveId" clId="{CDAB1E75-1FDE-4F40-80F3-634554960AF9}" dt="2020-10-05T00:04:45.576" v="3702"/>
@@ -13180,8 +13244,8 @@
           </a:p>
         </p:txBody>
       </p:sp>
-      <mc:AlternateContent xmlns:mc="http://schemas.openxmlformats.org/markup-compatibility/2006" xmlns:a14="http://schemas.microsoft.com/office/drawing/2010/main">
-        <mc:Choice Requires="a14">
+      <mc:AlternateContent xmlns:mc="http://schemas.openxmlformats.org/markup-compatibility/2006">
+        <mc:Choice xmlns:a14="http://schemas.microsoft.com/office/drawing/2010/main" Requires="a14">
           <p:sp>
             <p:nvSpPr>
               <p:cNvPr id="3" name="Content Placeholder 2">
@@ -13201,7 +13265,7 @@
             <p:spPr>
               <a:xfrm>
                 <a:off x="492371" y="2653800"/>
-                <a:ext cx="3084844" cy="3335519"/>
+                <a:ext cx="3360538" cy="3335519"/>
               </a:xfrm>
             </p:spPr>
             <p:txBody>
@@ -13210,9 +13274,11 @@
               </a:bodyPr>
               <a:lstStyle/>
               <a:p>
-                <a:pPr lvl="1"/>
+                <a:pPr marL="201168" lvl="1" indent="0">
+                  <a:buNone/>
+                </a:pPr>
                 <a:r>
-                  <a:rPr lang="es-CO" sz="1300" dirty="0">
+                  <a:rPr lang="es-CO" sz="2000" dirty="0">
                     <a:solidFill>
                       <a:srgbClr val="FFFFFF"/>
                     </a:solidFill>
@@ -13222,7 +13288,7 @@
                 <a14:m>
                   <m:oMath xmlns:m="http://schemas.openxmlformats.org/officeDocument/2006/math">
                     <m:r>
-                      <a:rPr lang="es-CO" sz="1300" b="0" i="1" smtClean="0">
+                      <a:rPr lang="es-CO" sz="2000" b="0" i="1" smtClean="0">
                         <a:solidFill>
                           <a:srgbClr val="FFFFFF"/>
                         </a:solidFill>
@@ -13233,7 +13299,7 @@
                     <m:d>
                       <m:dPr>
                         <m:ctrlPr>
-                          <a:rPr lang="es-CO" sz="1300" b="0" i="1" smtClean="0">
+                          <a:rPr lang="es-CO" sz="2000" b="0" i="1" smtClean="0">
                             <a:solidFill>
                               <a:srgbClr val="FFFFFF"/>
                             </a:solidFill>
@@ -13245,7 +13311,7 @@
                         <m:sSup>
                           <m:sSupPr>
                             <m:ctrlPr>
-                              <a:rPr lang="es-CO" sz="1300" b="0" i="1" smtClean="0">
+                              <a:rPr lang="es-CO" sz="2000" b="0" i="1" smtClean="0">
                                 <a:solidFill>
                                   <a:srgbClr val="FFFFFF"/>
                                 </a:solidFill>
@@ -13255,7 +13321,7 @@
                           </m:sSupPr>
                           <m:e>
                             <m:r>
-                              <a:rPr lang="es-CO" sz="1300" b="0" i="1" smtClean="0">
+                              <a:rPr lang="es-CO" sz="2000" b="0" i="1" smtClean="0">
                                 <a:solidFill>
                                   <a:srgbClr val="FFFFFF"/>
                                 </a:solidFill>
@@ -13266,7 +13332,7 @@
                           </m:e>
                           <m:sup>
                             <m:r>
-                              <a:rPr lang="es-CO" sz="1300" b="0" i="1" smtClean="0">
+                              <a:rPr lang="es-CO" sz="2000" b="0" i="1" smtClean="0">
                                 <a:solidFill>
                                   <a:srgbClr val="FFFFFF"/>
                                 </a:solidFill>
@@ -13281,7 +13347,7 @@
                   </m:oMath>
                 </a14:m>
                 <a:r>
-                  <a:rPr lang="en-US" sz="1300" dirty="0">
+                  <a:rPr lang="en-US" sz="2000" dirty="0">
                     <a:solidFill>
                       <a:srgbClr val="FFFFFF"/>
                     </a:solidFill>
@@ -13291,7 +13357,7 @@
                 <a14:m>
                   <m:oMath xmlns:m="http://schemas.openxmlformats.org/officeDocument/2006/math">
                     <m:r>
-                      <a:rPr lang="es-CO" sz="1300" b="0" i="1" smtClean="0">
+                      <a:rPr lang="es-CO" sz="2000" b="0" i="1" smtClean="0">
                         <a:solidFill>
                           <a:srgbClr val="FFFFFF"/>
                         </a:solidFill>
@@ -13302,7 +13368,7 @@
                     <m:d>
                       <m:dPr>
                         <m:ctrlPr>
-                          <a:rPr lang="es-CO" sz="1300" b="0" i="1" smtClean="0">
+                          <a:rPr lang="es-CO" sz="2000" b="0" i="1" smtClean="0">
                             <a:solidFill>
                               <a:srgbClr val="FFFFFF"/>
                             </a:solidFill>
@@ -13314,7 +13380,7 @@
                         <m:sSup>
                           <m:sSupPr>
                             <m:ctrlPr>
-                              <a:rPr lang="es-CO" sz="1300" b="0" i="1" smtClean="0">
+                              <a:rPr lang="es-CO" sz="2000" b="0" i="1" smtClean="0">
                                 <a:solidFill>
                                   <a:srgbClr val="FFFFFF"/>
                                 </a:solidFill>
@@ -13324,7 +13390,7 @@
                           </m:sSupPr>
                           <m:e>
                             <m:r>
-                              <a:rPr lang="es-CO" sz="1300" b="0" i="1" smtClean="0">
+                              <a:rPr lang="es-CO" sz="2000" b="0" i="1" smtClean="0">
                                 <a:solidFill>
                                   <a:srgbClr val="FFFFFF"/>
                                 </a:solidFill>
@@ -13335,7 +13401,7 @@
                           </m:e>
                           <m:sup>
                             <m:r>
-                              <a:rPr lang="es-CO" sz="1300" b="0" i="1" smtClean="0">
+                              <a:rPr lang="es-CO" sz="2000" b="0" i="1" smtClean="0">
                                 <a:solidFill>
                                   <a:srgbClr val="FFFFFF"/>
                                 </a:solidFill>
@@ -13350,7 +13416,7 @@
                   </m:oMath>
                 </a14:m>
                 <a:r>
-                  <a:rPr lang="en-US" sz="1300" dirty="0">
+                  <a:rPr lang="en-US" sz="2000" dirty="0">
                     <a:solidFill>
                       <a:srgbClr val="FFFFFF"/>
                     </a:solidFill>
@@ -13371,7 +13437,7 @@
             </p:txBody>
           </p:sp>
         </mc:Choice>
-        <mc:Fallback xmlns="">
+        <mc:Fallback>
           <p:sp>
             <p:nvSpPr>
               <p:cNvPr id="3" name="Content Placeholder 2">
@@ -13391,12 +13457,12 @@
             <p:spPr>
               <a:xfrm>
                 <a:off x="492371" y="2653800"/>
-                <a:ext cx="3084844" cy="3335519"/>
+                <a:ext cx="3360538" cy="3335519"/>
               </a:xfrm>
               <a:blipFill>
                 <a:blip r:embed="rId2"/>
                 <a:stretch>
-                  <a:fillRect t="-914"/>
+                  <a:fillRect t="-1828" r="-1815"/>
                 </a:stretch>
               </a:blipFill>
             </p:spPr>
@@ -14107,19 +14173,21 @@
         </p:nvSpPr>
         <p:spPr>
           <a:xfrm>
-            <a:off x="492371" y="2653800"/>
+            <a:off x="492370" y="3137545"/>
             <a:ext cx="3084844" cy="1787571"/>
           </a:xfrm>
         </p:spPr>
         <p:txBody>
           <a:bodyPr>
-            <a:normAutofit/>
+            <a:normAutofit lnSpcReduction="10000"/>
           </a:bodyPr>
           <a:lstStyle/>
           <a:p>
-            <a:pPr lvl="1"/>
-            <a:r>
-              <a:rPr lang="en-US" sz="1300" dirty="0">
+            <a:pPr marL="201168" lvl="1" indent="0">
+              <a:buNone/>
+            </a:pPr>
+            <a:r>
+              <a:rPr lang="en-US" sz="2000" dirty="0">
                 <a:solidFill>
                   <a:srgbClr val="FFFFFF"/>
                 </a:solidFill>
@@ -14253,6 +14321,493 @@
 <file path=ppt/slides/slide17.xml><?xml version="1.0" encoding="utf-8"?>
 <p:sld xmlns:a="http://schemas.openxmlformats.org/drawingml/2006/main" xmlns:r="http://schemas.openxmlformats.org/officeDocument/2006/relationships" xmlns:p="http://schemas.openxmlformats.org/presentationml/2006/main">
   <p:cSld>
+    <p:bg>
+      <p:bgPr>
+        <a:solidFill>
+          <a:schemeClr val="bg1"/>
+        </a:solidFill>
+        <a:effectLst/>
+      </p:bgPr>
+    </p:bg>
+    <p:spTree>
+      <p:nvGrpSpPr>
+        <p:cNvPr id="1" name=""/>
+        <p:cNvGrpSpPr/>
+        <p:nvPr/>
+      </p:nvGrpSpPr>
+      <p:grpSpPr>
+        <a:xfrm>
+          <a:off x="0" y="0"/>
+          <a:ext cx="0" cy="0"/>
+          <a:chOff x="0" y="0"/>
+          <a:chExt cx="0" cy="0"/>
+        </a:xfrm>
+      </p:grpSpPr>
+      <p:sp useBgFill="1">
+        <p:nvSpPr>
+          <p:cNvPr id="12" name="Rectangle 11">
+            <a:extLst>
+              <a:ext uri="{FF2B5EF4-FFF2-40B4-BE49-F238E27FC236}">
+                <a16:creationId xmlns:a16="http://schemas.microsoft.com/office/drawing/2014/main" id="{44CC594A-A820-450F-B363-C19201FCFEC6}"/>
+              </a:ext>
+              <a:ext uri="{C183D7F6-B498-43B3-948B-1728B52AA6E4}">
+                <adec:decorative xmlns:adec="http://schemas.microsoft.com/office/drawing/2017/decorative" val="1"/>
+              </a:ext>
+            </a:extLst>
+          </p:cNvPr>
+          <p:cNvSpPr>
+            <a:spLocks noGrp="1" noRot="1" noChangeAspect="1" noMove="1" noResize="1" noEditPoints="1" noAdjustHandles="1" noChangeArrowheads="1" noChangeShapeType="1" noTextEdit="1"/>
+          </p:cNvSpPr>
+          <p:nvPr>
+            <p:extLst>
+              <p:ext uri="{386F3935-93C4-4BCD-93E2-E3B085C9AB24}">
+                <p16:designElem xmlns:p16="http://schemas.microsoft.com/office/powerpoint/2015/main" val="1"/>
+              </p:ext>
+            </p:extLst>
+          </p:nvPr>
+        </p:nvSpPr>
+        <p:spPr>
+          <a:xfrm>
+            <a:off x="0" y="0"/>
+            <a:ext cx="12186315" cy="6858000"/>
+          </a:xfrm>
+          <a:prstGeom prst="rect">
+            <a:avLst/>
+          </a:prstGeom>
+          <a:ln>
+            <a:noFill/>
+          </a:ln>
+        </p:spPr>
+        <p:style>
+          <a:lnRef idx="2">
+            <a:schemeClr val="accent6">
+              <a:shade val="50000"/>
+            </a:schemeClr>
+          </a:lnRef>
+          <a:fillRef idx="1001">
+            <a:schemeClr val="lt1"/>
+          </a:fillRef>
+          <a:effectRef idx="0">
+            <a:schemeClr val="accent6"/>
+          </a:effectRef>
+          <a:fontRef idx="minor">
+            <a:schemeClr val="lt1"/>
+          </a:fontRef>
+        </p:style>
+        <p:txBody>
+          <a:bodyPr rtlCol="0" anchor="ctr"/>
+          <a:lstStyle/>
+          <a:p>
+            <a:pPr algn="ctr"/>
+            <a:endParaRPr lang="en-US"/>
+          </a:p>
+        </p:txBody>
+      </p:sp>
+      <p:sp>
+        <p:nvSpPr>
+          <p:cNvPr id="14" name="Rectangle 13">
+            <a:extLst>
+              <a:ext uri="{FF2B5EF4-FFF2-40B4-BE49-F238E27FC236}">
+                <a16:creationId xmlns:a16="http://schemas.microsoft.com/office/drawing/2014/main" id="{59FAB3DA-E9ED-4574-ABCC-378BC0FF1BBC}"/>
+              </a:ext>
+              <a:ext uri="{C183D7F6-B498-43B3-948B-1728B52AA6E4}">
+                <adec:decorative xmlns:adec="http://schemas.microsoft.com/office/drawing/2017/decorative" val="1"/>
+              </a:ext>
+            </a:extLst>
+          </p:cNvPr>
+          <p:cNvSpPr>
+            <a:spLocks noGrp="1" noRot="1" noChangeAspect="1" noMove="1" noResize="1" noEditPoints="1" noAdjustHandles="1" noChangeArrowheads="1" noChangeShapeType="1" noTextEdit="1"/>
+          </p:cNvSpPr>
+          <p:nvPr>
+            <p:extLst>
+              <p:ext uri="{386F3935-93C4-4BCD-93E2-E3B085C9AB24}">
+                <p16:designElem xmlns:p16="http://schemas.microsoft.com/office/powerpoint/2015/main" val="1"/>
+              </p:ext>
+            </p:extLst>
+          </p:nvPr>
+        </p:nvSpPr>
+        <p:spPr>
+          <a:xfrm>
+            <a:off x="16" y="0"/>
+            <a:ext cx="4050791" cy="6858000"/>
+          </a:xfrm>
+          <a:prstGeom prst="rect">
+            <a:avLst/>
+          </a:prstGeom>
+          <a:solidFill>
+            <a:schemeClr val="accent2"/>
+          </a:solidFill>
+          <a:ln>
+            <a:noFill/>
+          </a:ln>
+        </p:spPr>
+        <p:style>
+          <a:lnRef idx="2">
+            <a:schemeClr val="accent1">
+              <a:shade val="50000"/>
+            </a:schemeClr>
+          </a:lnRef>
+          <a:fillRef idx="1">
+            <a:schemeClr val="accent1"/>
+          </a:fillRef>
+          <a:effectRef idx="0">
+            <a:schemeClr val="accent1"/>
+          </a:effectRef>
+          <a:fontRef idx="minor">
+            <a:schemeClr val="lt1"/>
+          </a:fontRef>
+        </p:style>
+      </p:sp>
+      <p:sp>
+        <p:nvSpPr>
+          <p:cNvPr id="2" name="Title 1">
+            <a:extLst>
+              <a:ext uri="{FF2B5EF4-FFF2-40B4-BE49-F238E27FC236}">
+                <a16:creationId xmlns:a16="http://schemas.microsoft.com/office/drawing/2014/main" id="{6CAB4602-68C4-4C11-A779-70DB4387CA5A}"/>
+              </a:ext>
+            </a:extLst>
+          </p:cNvPr>
+          <p:cNvSpPr>
+            <a:spLocks noGrp="1"/>
+          </p:cNvSpPr>
+          <p:nvPr>
+            <p:ph type="title"/>
+          </p:nvPr>
+        </p:nvSpPr>
+        <p:spPr>
+          <a:xfrm>
+            <a:off x="492369" y="516835"/>
+            <a:ext cx="3417157" cy="2103875"/>
+          </a:xfrm>
+        </p:spPr>
+        <p:txBody>
+          <a:bodyPr>
+            <a:normAutofit/>
+          </a:bodyPr>
+          <a:lstStyle/>
+          <a:p>
+            <a:r>
+              <a:rPr lang="es-CO" sz="3600" dirty="0" err="1">
+                <a:solidFill>
+                  <a:srgbClr val="FFFFFF"/>
+                </a:solidFill>
+              </a:rPr>
+              <a:t>Memory</a:t>
+            </a:r>
+            <a:r>
+              <a:rPr lang="es-CO" sz="3600" dirty="0">
+                <a:solidFill>
+                  <a:srgbClr val="FFFFFF"/>
+                </a:solidFill>
+              </a:rPr>
+              <a:t> </a:t>
+            </a:r>
+            <a:r>
+              <a:rPr lang="es-CO" sz="3600" dirty="0" err="1">
+                <a:solidFill>
+                  <a:srgbClr val="FFFFFF"/>
+                </a:solidFill>
+              </a:rPr>
+              <a:t>Profiling</a:t>
+            </a:r>
+            <a:endParaRPr lang="it-IT" sz="3600" dirty="0">
+              <a:solidFill>
+                <a:srgbClr val="FFFFFF"/>
+              </a:solidFill>
+            </a:endParaRPr>
+          </a:p>
+        </p:txBody>
+      </p:sp>
+      <p:sp>
+        <p:nvSpPr>
+          <p:cNvPr id="3" name="Content Placeholder 2">
+            <a:extLst>
+              <a:ext uri="{FF2B5EF4-FFF2-40B4-BE49-F238E27FC236}">
+                <a16:creationId xmlns:a16="http://schemas.microsoft.com/office/drawing/2014/main" id="{287D0903-71D6-4943-89AD-87DB63B475BB}"/>
+              </a:ext>
+            </a:extLst>
+          </p:cNvPr>
+          <p:cNvSpPr>
+            <a:spLocks noGrp="1"/>
+          </p:cNvSpPr>
+          <p:nvPr>
+            <p:ph idx="1"/>
+          </p:nvPr>
+        </p:nvSpPr>
+        <p:spPr>
+          <a:xfrm>
+            <a:off x="477622" y="3275237"/>
+            <a:ext cx="3084844" cy="1030433"/>
+          </a:xfrm>
+        </p:spPr>
+        <p:txBody>
+          <a:bodyPr>
+            <a:normAutofit/>
+          </a:bodyPr>
+          <a:lstStyle/>
+          <a:p>
+            <a:pPr marL="201168" lvl="1" indent="0">
+              <a:buNone/>
+            </a:pPr>
+            <a:r>
+              <a:rPr lang="es-CO" sz="2000" dirty="0" err="1">
+                <a:solidFill>
+                  <a:srgbClr val="FFFFFF"/>
+                </a:solidFill>
+              </a:rPr>
+              <a:t>However</a:t>
+            </a:r>
+            <a:r>
+              <a:rPr lang="es-CO" sz="2000" dirty="0">
+                <a:solidFill>
+                  <a:srgbClr val="FFFFFF"/>
+                </a:solidFill>
+              </a:rPr>
+              <a:t>, after a </a:t>
+            </a:r>
+            <a:r>
+              <a:rPr lang="es-CO" sz="2000" dirty="0" err="1">
+                <a:solidFill>
+                  <a:srgbClr val="FFFFFF"/>
+                </a:solidFill>
+              </a:rPr>
+              <a:t>certain</a:t>
+            </a:r>
+            <a:r>
+              <a:rPr lang="es-CO" sz="2000" dirty="0">
+                <a:solidFill>
+                  <a:srgbClr val="FFFFFF"/>
+                </a:solidFill>
+              </a:rPr>
+              <a:t> </a:t>
+            </a:r>
+            <a:r>
+              <a:rPr lang="es-CO" sz="2000" dirty="0" err="1">
+                <a:solidFill>
+                  <a:srgbClr val="FFFFFF"/>
+                </a:solidFill>
+              </a:rPr>
+              <a:t>number</a:t>
+            </a:r>
+            <a:r>
+              <a:rPr lang="es-CO" sz="2000" dirty="0">
+                <a:solidFill>
+                  <a:srgbClr val="FFFFFF"/>
+                </a:solidFill>
+              </a:rPr>
+              <a:t> </a:t>
+            </a:r>
+            <a:r>
+              <a:rPr lang="es-CO" sz="2000" dirty="0" err="1">
+                <a:solidFill>
+                  <a:srgbClr val="FFFFFF"/>
+                </a:solidFill>
+              </a:rPr>
+              <a:t>of</a:t>
+            </a:r>
+            <a:r>
+              <a:rPr lang="es-CO" sz="2000" dirty="0">
+                <a:solidFill>
+                  <a:srgbClr val="FFFFFF"/>
+                </a:solidFill>
+              </a:rPr>
+              <a:t> </a:t>
+            </a:r>
+            <a:r>
+              <a:rPr lang="es-CO" sz="2000" dirty="0" err="1">
+                <a:solidFill>
+                  <a:srgbClr val="FFFFFF"/>
+                </a:solidFill>
+              </a:rPr>
+              <a:t>nodes</a:t>
+            </a:r>
+            <a:r>
+              <a:rPr lang="es-CO" sz="2000" dirty="0">
+                <a:solidFill>
+                  <a:srgbClr val="FFFFFF"/>
+                </a:solidFill>
+              </a:rPr>
+              <a:t>, OPT2 </a:t>
+            </a:r>
+            <a:r>
+              <a:rPr lang="es-CO" sz="2000" dirty="0" err="1">
+                <a:solidFill>
+                  <a:srgbClr val="FFFFFF"/>
+                </a:solidFill>
+              </a:rPr>
+              <a:t>will</a:t>
+            </a:r>
+            <a:r>
+              <a:rPr lang="es-CO" sz="2000" dirty="0">
+                <a:solidFill>
+                  <a:srgbClr val="FFFFFF"/>
+                </a:solidFill>
+              </a:rPr>
+              <a:t> </a:t>
+            </a:r>
+            <a:r>
+              <a:rPr lang="es-CO" sz="2000" dirty="0" err="1">
+                <a:solidFill>
+                  <a:srgbClr val="FFFFFF"/>
+                </a:solidFill>
+              </a:rPr>
+              <a:t>perform</a:t>
+            </a:r>
+            <a:r>
+              <a:rPr lang="es-CO" sz="2000" dirty="0">
+                <a:solidFill>
+                  <a:srgbClr val="FFFFFF"/>
+                </a:solidFill>
+              </a:rPr>
+              <a:t> </a:t>
+            </a:r>
+            <a:r>
+              <a:rPr lang="es-CO" sz="2000" dirty="0" err="1">
+                <a:solidFill>
+                  <a:srgbClr val="FFFFFF"/>
+                </a:solidFill>
+              </a:rPr>
+              <a:t>better</a:t>
+            </a:r>
+            <a:r>
+              <a:rPr lang="es-CO" sz="2000" dirty="0">
+                <a:solidFill>
+                  <a:srgbClr val="FFFFFF"/>
+                </a:solidFill>
+              </a:rPr>
+              <a:t> </a:t>
+            </a:r>
+            <a:r>
+              <a:rPr lang="es-CO" sz="2000" dirty="0" err="1">
+                <a:solidFill>
+                  <a:srgbClr val="FFFFFF"/>
+                </a:solidFill>
+              </a:rPr>
+              <a:t>than</a:t>
+            </a:r>
+            <a:r>
+              <a:rPr lang="es-CO" sz="2000" dirty="0">
+                <a:solidFill>
+                  <a:srgbClr val="FFFFFF"/>
+                </a:solidFill>
+              </a:rPr>
+              <a:t> OPT1.</a:t>
+            </a:r>
+            <a:endParaRPr lang="it-IT" sz="2000" dirty="0">
+              <a:solidFill>
+                <a:srgbClr val="FFFFFF"/>
+              </a:solidFill>
+            </a:endParaRPr>
+          </a:p>
+        </p:txBody>
+      </p:sp>
+      <p:sp>
+        <p:nvSpPr>
+          <p:cNvPr id="16" name="Rectangle 15">
+            <a:extLst>
+              <a:ext uri="{FF2B5EF4-FFF2-40B4-BE49-F238E27FC236}">
+                <a16:creationId xmlns:a16="http://schemas.microsoft.com/office/drawing/2014/main" id="{53B8D6B0-55D6-48DC-86D8-FD95D5F118AB}"/>
+              </a:ext>
+              <a:ext uri="{C183D7F6-B498-43B3-948B-1728B52AA6E4}">
+                <adec:decorative xmlns:adec="http://schemas.microsoft.com/office/drawing/2017/decorative" val="1"/>
+              </a:ext>
+            </a:extLst>
+          </p:cNvPr>
+          <p:cNvSpPr>
+            <a:spLocks noGrp="1" noRot="1" noChangeAspect="1" noMove="1" noResize="1" noEditPoints="1" noAdjustHandles="1" noChangeArrowheads="1" noChangeShapeType="1" noTextEdit="1"/>
+          </p:cNvSpPr>
+          <p:nvPr>
+            <p:extLst>
+              <p:ext uri="{386F3935-93C4-4BCD-93E2-E3B085C9AB24}">
+                <p16:designElem xmlns:p16="http://schemas.microsoft.com/office/powerpoint/2015/main" val="1"/>
+              </p:ext>
+            </p:extLst>
+          </p:nvPr>
+        </p:nvSpPr>
+        <p:spPr>
+          <a:xfrm>
+            <a:off x="4040071" y="0"/>
+            <a:ext cx="64008" cy="6858000"/>
+          </a:xfrm>
+          <a:prstGeom prst="rect">
+            <a:avLst/>
+          </a:prstGeom>
+          <a:solidFill>
+            <a:schemeClr val="accent1"/>
+          </a:solidFill>
+          <a:ln>
+            <a:noFill/>
+          </a:ln>
+        </p:spPr>
+        <p:style>
+          <a:lnRef idx="2">
+            <a:schemeClr val="accent1">
+              <a:shade val="50000"/>
+            </a:schemeClr>
+          </a:lnRef>
+          <a:fillRef idx="1">
+            <a:schemeClr val="accent1"/>
+          </a:fillRef>
+          <a:effectRef idx="0">
+            <a:schemeClr val="accent1"/>
+          </a:effectRef>
+          <a:fontRef idx="minor">
+            <a:schemeClr val="lt1"/>
+          </a:fontRef>
+        </p:style>
+      </p:sp>
+      <p:pic>
+        <p:nvPicPr>
+          <p:cNvPr id="7" name="Picture 6" descr="Chart, line chart&#10;&#10;Description automatically generated">
+            <a:extLst>
+              <a:ext uri="{FF2B5EF4-FFF2-40B4-BE49-F238E27FC236}">
+                <a16:creationId xmlns:a16="http://schemas.microsoft.com/office/drawing/2014/main" id="{723AAA43-9B31-439B-AD08-E8DE08C708B7}"/>
+              </a:ext>
+            </a:extLst>
+          </p:cNvPr>
+          <p:cNvPicPr>
+            <a:picLocks noChangeAspect="1"/>
+          </p:cNvPicPr>
+          <p:nvPr/>
+        </p:nvPicPr>
+        <p:blipFill>
+          <a:blip r:embed="rId2">
+            <a:extLst>
+              <a:ext uri="{28A0092B-C50C-407E-A947-70E740481C1C}">
+                <a14:useLocalDpi xmlns:a14="http://schemas.microsoft.com/office/drawing/2010/main" val="0"/>
+              </a:ext>
+            </a:extLst>
+          </a:blip>
+          <a:stretch>
+            <a:fillRect/>
+          </a:stretch>
+        </p:blipFill>
+        <p:spPr>
+          <a:xfrm>
+            <a:off x="4742017" y="879719"/>
+            <a:ext cx="6798082" cy="5098561"/>
+          </a:xfrm>
+          <a:prstGeom prst="rect">
+            <a:avLst/>
+          </a:prstGeom>
+        </p:spPr>
+      </p:pic>
+    </p:spTree>
+    <p:extLst>
+      <p:ext uri="{BB962C8B-B14F-4D97-AF65-F5344CB8AC3E}">
+        <p14:creationId xmlns:p14="http://schemas.microsoft.com/office/powerpoint/2010/main" val="2840224508"/>
+      </p:ext>
+    </p:extLst>
+  </p:cSld>
+  <p:clrMapOvr>
+    <a:masterClrMapping/>
+  </p:clrMapOvr>
+</p:sld>
+</file>
+
+<file path=ppt/slides/slide18.xml><?xml version="1.0" encoding="utf-8"?>
+<p:sld xmlns:a="http://schemas.openxmlformats.org/drawingml/2006/main" xmlns:r="http://schemas.openxmlformats.org/officeDocument/2006/relationships" xmlns:p="http://schemas.openxmlformats.org/presentationml/2006/main">
+  <p:cSld>
     <p:spTree>
       <p:nvGrpSpPr>
         <p:cNvPr id="1" name=""/>
@@ -14657,7 +15212,7 @@
 </p:sld>
 </file>
 
-<file path=ppt/slides/slide18.xml><?xml version="1.0" encoding="utf-8"?>
+<file path=ppt/slides/slide19.xml><?xml version="1.0" encoding="utf-8"?>
 <p:sld xmlns:a="http://schemas.openxmlformats.org/drawingml/2006/main" xmlns:r="http://schemas.openxmlformats.org/officeDocument/2006/relationships" xmlns:p="http://schemas.openxmlformats.org/presentationml/2006/main">
   <p:cSld>
     <p:spTree>
@@ -14894,198 +15449,6 @@
 </p:sld>
 </file>
 
-<file path=ppt/slides/slide19.xml><?xml version="1.0" encoding="utf-8"?>
-<p:sld xmlns:a="http://schemas.openxmlformats.org/drawingml/2006/main" xmlns:r="http://schemas.openxmlformats.org/officeDocument/2006/relationships" xmlns:p="http://schemas.openxmlformats.org/presentationml/2006/main">
-  <p:cSld>
-    <p:spTree>
-      <p:nvGrpSpPr>
-        <p:cNvPr id="1" name=""/>
-        <p:cNvGrpSpPr/>
-        <p:nvPr/>
-      </p:nvGrpSpPr>
-      <p:grpSpPr>
-        <a:xfrm>
-          <a:off x="0" y="0"/>
-          <a:ext cx="0" cy="0"/>
-          <a:chOff x="0" y="0"/>
-          <a:chExt cx="0" cy="0"/>
-        </a:xfrm>
-      </p:grpSpPr>
-      <p:sp>
-        <p:nvSpPr>
-          <p:cNvPr id="2" name="Title 1">
-            <a:extLst>
-              <a:ext uri="{FF2B5EF4-FFF2-40B4-BE49-F238E27FC236}">
-                <a16:creationId xmlns:a16="http://schemas.microsoft.com/office/drawing/2014/main" id="{E8AD05AB-1C96-402D-9C20-D98BBB3CA6D4}"/>
-              </a:ext>
-            </a:extLst>
-          </p:cNvPr>
-          <p:cNvSpPr>
-            <a:spLocks noGrp="1"/>
-          </p:cNvSpPr>
-          <p:nvPr>
-            <p:ph type="title"/>
-          </p:nvPr>
-        </p:nvSpPr>
-        <p:spPr/>
-        <p:txBody>
-          <a:bodyPr/>
-          <a:lstStyle/>
-          <a:p>
-            <a:r>
-              <a:rPr lang="es-CO" dirty="0"/>
-              <a:t>Manual </a:t>
-            </a:r>
-            <a:r>
-              <a:rPr lang="es-CO" dirty="0" err="1"/>
-              <a:t>Profiling</a:t>
-            </a:r>
-            <a:endParaRPr lang="it-IT" dirty="0"/>
-          </a:p>
-        </p:txBody>
-      </p:sp>
-      <p:sp>
-        <p:nvSpPr>
-          <p:cNvPr id="3" name="Content Placeholder 2">
-            <a:extLst>
-              <a:ext uri="{FF2B5EF4-FFF2-40B4-BE49-F238E27FC236}">
-                <a16:creationId xmlns:a16="http://schemas.microsoft.com/office/drawing/2014/main" id="{0E407C6A-87D4-43F2-B971-4CDDE4ABB2FB}"/>
-              </a:ext>
-            </a:extLst>
-          </p:cNvPr>
-          <p:cNvSpPr>
-            <a:spLocks noGrp="1"/>
-          </p:cNvSpPr>
-          <p:nvPr>
-            <p:ph idx="1"/>
-          </p:nvPr>
-        </p:nvSpPr>
-        <p:spPr/>
-        <p:txBody>
-          <a:bodyPr/>
-          <a:lstStyle/>
-          <a:p>
-            <a:r>
-              <a:rPr lang="es-CO" dirty="0">
-                <a:solidFill>
-                  <a:schemeClr val="tx1">
-                    <a:lumMod val="65000"/>
-                    <a:lumOff val="35000"/>
-                  </a:schemeClr>
-                </a:solidFill>
-              </a:rPr>
-              <a:t>%</a:t>
-            </a:r>
-            <a:r>
-              <a:rPr lang="es-CO" dirty="0" err="1">
-                <a:solidFill>
-                  <a:schemeClr val="tx1">
-                    <a:lumMod val="65000"/>
-                    <a:lumOff val="35000"/>
-                  </a:schemeClr>
-                </a:solidFill>
-              </a:rPr>
-              <a:t>prun</a:t>
-            </a:r>
-            <a:r>
-              <a:rPr lang="es-CO" dirty="0">
-                <a:solidFill>
-                  <a:schemeClr val="tx1">
-                    <a:lumMod val="65000"/>
-                    <a:lumOff val="35000"/>
-                  </a:schemeClr>
-                </a:solidFill>
-              </a:rPr>
-              <a:t> can be </a:t>
-            </a:r>
-            <a:r>
-              <a:rPr lang="es-CO" dirty="0" err="1">
-                <a:solidFill>
-                  <a:schemeClr val="tx1">
-                    <a:lumMod val="65000"/>
-                    <a:lumOff val="35000"/>
-                  </a:schemeClr>
-                </a:solidFill>
-              </a:rPr>
-              <a:t>used</a:t>
-            </a:r>
-            <a:r>
-              <a:rPr lang="es-CO" dirty="0">
-                <a:solidFill>
-                  <a:schemeClr val="tx1">
-                    <a:lumMod val="65000"/>
-                    <a:lumOff val="35000"/>
-                  </a:schemeClr>
-                </a:solidFill>
-              </a:rPr>
-              <a:t> </a:t>
-            </a:r>
-            <a:r>
-              <a:rPr lang="en-US" b="0" i="0" dirty="0">
-                <a:solidFill>
-                  <a:schemeClr val="tx1">
-                    <a:lumMod val="65000"/>
-                    <a:lumOff val="35000"/>
-                  </a:schemeClr>
-                </a:solidFill>
-                <a:effectLst/>
-              </a:rPr>
-              <a:t>to create a table that indicates, in order of total time on each function call, where the execution is spending the most time.</a:t>
-            </a:r>
-            <a:endParaRPr lang="it-IT" dirty="0">
-              <a:solidFill>
-                <a:schemeClr val="tx1">
-                  <a:lumMod val="65000"/>
-                  <a:lumOff val="35000"/>
-                </a:schemeClr>
-              </a:solidFill>
-            </a:endParaRPr>
-          </a:p>
-        </p:txBody>
-      </p:sp>
-      <p:pic>
-        <p:nvPicPr>
-          <p:cNvPr id="5" name="Picture 4">
-            <a:extLst>
-              <a:ext uri="{FF2B5EF4-FFF2-40B4-BE49-F238E27FC236}">
-                <a16:creationId xmlns:a16="http://schemas.microsoft.com/office/drawing/2014/main" id="{FBBC5027-FB3B-4E92-A2DD-A292E36BBB5E}"/>
-              </a:ext>
-            </a:extLst>
-          </p:cNvPr>
-          <p:cNvPicPr>
-            <a:picLocks noChangeAspect="1"/>
-          </p:cNvPicPr>
-          <p:nvPr/>
-        </p:nvPicPr>
-        <p:blipFill>
-          <a:blip r:embed="rId2"/>
-          <a:stretch>
-            <a:fillRect/>
-          </a:stretch>
-        </p:blipFill>
-        <p:spPr>
-          <a:xfrm>
-            <a:off x="1097280" y="2654900"/>
-            <a:ext cx="10221749" cy="3462769"/>
-          </a:xfrm>
-          <a:prstGeom prst="rect">
-            <a:avLst/>
-          </a:prstGeom>
-        </p:spPr>
-      </p:pic>
-    </p:spTree>
-    <p:extLst>
-      <p:ext uri="{BB962C8B-B14F-4D97-AF65-F5344CB8AC3E}">
-        <p14:creationId xmlns:p14="http://schemas.microsoft.com/office/powerpoint/2010/main" val="895853198"/>
-      </p:ext>
-    </p:extLst>
-  </p:cSld>
-  <p:clrMapOvr>
-    <a:masterClrMapping/>
-  </p:clrMapOvr>
-</p:sld>
-</file>
-
 <file path=ppt/slides/slide2.xml><?xml version="1.0" encoding="utf-8"?>
 <p:sld xmlns:a="http://schemas.openxmlformats.org/drawingml/2006/main" xmlns:r="http://schemas.openxmlformats.org/officeDocument/2006/relationships" xmlns:p="http://schemas.openxmlformats.org/presentationml/2006/main">
   <p:cSld>
@@ -15233,6 +15596,198 @@
 </file>
 
 <file path=ppt/slides/slide20.xml><?xml version="1.0" encoding="utf-8"?>
+<p:sld xmlns:a="http://schemas.openxmlformats.org/drawingml/2006/main" xmlns:r="http://schemas.openxmlformats.org/officeDocument/2006/relationships" xmlns:p="http://schemas.openxmlformats.org/presentationml/2006/main">
+  <p:cSld>
+    <p:spTree>
+      <p:nvGrpSpPr>
+        <p:cNvPr id="1" name=""/>
+        <p:cNvGrpSpPr/>
+        <p:nvPr/>
+      </p:nvGrpSpPr>
+      <p:grpSpPr>
+        <a:xfrm>
+          <a:off x="0" y="0"/>
+          <a:ext cx="0" cy="0"/>
+          <a:chOff x="0" y="0"/>
+          <a:chExt cx="0" cy="0"/>
+        </a:xfrm>
+      </p:grpSpPr>
+      <p:sp>
+        <p:nvSpPr>
+          <p:cNvPr id="2" name="Title 1">
+            <a:extLst>
+              <a:ext uri="{FF2B5EF4-FFF2-40B4-BE49-F238E27FC236}">
+                <a16:creationId xmlns:a16="http://schemas.microsoft.com/office/drawing/2014/main" id="{E8AD05AB-1C96-402D-9C20-D98BBB3CA6D4}"/>
+              </a:ext>
+            </a:extLst>
+          </p:cNvPr>
+          <p:cNvSpPr>
+            <a:spLocks noGrp="1"/>
+          </p:cNvSpPr>
+          <p:nvPr>
+            <p:ph type="title"/>
+          </p:nvPr>
+        </p:nvSpPr>
+        <p:spPr/>
+        <p:txBody>
+          <a:bodyPr/>
+          <a:lstStyle/>
+          <a:p>
+            <a:r>
+              <a:rPr lang="es-CO" dirty="0"/>
+              <a:t>Manual </a:t>
+            </a:r>
+            <a:r>
+              <a:rPr lang="es-CO" dirty="0" err="1"/>
+              <a:t>Profiling</a:t>
+            </a:r>
+            <a:endParaRPr lang="it-IT" dirty="0"/>
+          </a:p>
+        </p:txBody>
+      </p:sp>
+      <p:sp>
+        <p:nvSpPr>
+          <p:cNvPr id="3" name="Content Placeholder 2">
+            <a:extLst>
+              <a:ext uri="{FF2B5EF4-FFF2-40B4-BE49-F238E27FC236}">
+                <a16:creationId xmlns:a16="http://schemas.microsoft.com/office/drawing/2014/main" id="{0E407C6A-87D4-43F2-B971-4CDDE4ABB2FB}"/>
+              </a:ext>
+            </a:extLst>
+          </p:cNvPr>
+          <p:cNvSpPr>
+            <a:spLocks noGrp="1"/>
+          </p:cNvSpPr>
+          <p:nvPr>
+            <p:ph idx="1"/>
+          </p:nvPr>
+        </p:nvSpPr>
+        <p:spPr/>
+        <p:txBody>
+          <a:bodyPr/>
+          <a:lstStyle/>
+          <a:p>
+            <a:r>
+              <a:rPr lang="es-CO" dirty="0">
+                <a:solidFill>
+                  <a:schemeClr val="tx1">
+                    <a:lumMod val="65000"/>
+                    <a:lumOff val="35000"/>
+                  </a:schemeClr>
+                </a:solidFill>
+              </a:rPr>
+              <a:t>%</a:t>
+            </a:r>
+            <a:r>
+              <a:rPr lang="es-CO" dirty="0" err="1">
+                <a:solidFill>
+                  <a:schemeClr val="tx1">
+                    <a:lumMod val="65000"/>
+                    <a:lumOff val="35000"/>
+                  </a:schemeClr>
+                </a:solidFill>
+              </a:rPr>
+              <a:t>prun</a:t>
+            </a:r>
+            <a:r>
+              <a:rPr lang="es-CO" dirty="0">
+                <a:solidFill>
+                  <a:schemeClr val="tx1">
+                    <a:lumMod val="65000"/>
+                    <a:lumOff val="35000"/>
+                  </a:schemeClr>
+                </a:solidFill>
+              </a:rPr>
+              <a:t> can be </a:t>
+            </a:r>
+            <a:r>
+              <a:rPr lang="es-CO" dirty="0" err="1">
+                <a:solidFill>
+                  <a:schemeClr val="tx1">
+                    <a:lumMod val="65000"/>
+                    <a:lumOff val="35000"/>
+                  </a:schemeClr>
+                </a:solidFill>
+              </a:rPr>
+              <a:t>used</a:t>
+            </a:r>
+            <a:r>
+              <a:rPr lang="es-CO" dirty="0">
+                <a:solidFill>
+                  <a:schemeClr val="tx1">
+                    <a:lumMod val="65000"/>
+                    <a:lumOff val="35000"/>
+                  </a:schemeClr>
+                </a:solidFill>
+              </a:rPr>
+              <a:t> </a:t>
+            </a:r>
+            <a:r>
+              <a:rPr lang="en-US" b="0" i="0" dirty="0">
+                <a:solidFill>
+                  <a:schemeClr val="tx1">
+                    <a:lumMod val="65000"/>
+                    <a:lumOff val="35000"/>
+                  </a:schemeClr>
+                </a:solidFill>
+                <a:effectLst/>
+              </a:rPr>
+              <a:t>to create a table that indicates, in order of total time on each function call, where the execution is spending the most time.</a:t>
+            </a:r>
+            <a:endParaRPr lang="it-IT" dirty="0">
+              <a:solidFill>
+                <a:schemeClr val="tx1">
+                  <a:lumMod val="65000"/>
+                  <a:lumOff val="35000"/>
+                </a:schemeClr>
+              </a:solidFill>
+            </a:endParaRPr>
+          </a:p>
+        </p:txBody>
+      </p:sp>
+      <p:pic>
+        <p:nvPicPr>
+          <p:cNvPr id="5" name="Picture 4">
+            <a:extLst>
+              <a:ext uri="{FF2B5EF4-FFF2-40B4-BE49-F238E27FC236}">
+                <a16:creationId xmlns:a16="http://schemas.microsoft.com/office/drawing/2014/main" id="{FBBC5027-FB3B-4E92-A2DD-A292E36BBB5E}"/>
+              </a:ext>
+            </a:extLst>
+          </p:cNvPr>
+          <p:cNvPicPr>
+            <a:picLocks noChangeAspect="1"/>
+          </p:cNvPicPr>
+          <p:nvPr/>
+        </p:nvPicPr>
+        <p:blipFill>
+          <a:blip r:embed="rId2"/>
+          <a:stretch>
+            <a:fillRect/>
+          </a:stretch>
+        </p:blipFill>
+        <p:spPr>
+          <a:xfrm>
+            <a:off x="1097280" y="2654900"/>
+            <a:ext cx="10221749" cy="3462769"/>
+          </a:xfrm>
+          <a:prstGeom prst="rect">
+            <a:avLst/>
+          </a:prstGeom>
+        </p:spPr>
+      </p:pic>
+    </p:spTree>
+    <p:extLst>
+      <p:ext uri="{BB962C8B-B14F-4D97-AF65-F5344CB8AC3E}">
+        <p14:creationId xmlns:p14="http://schemas.microsoft.com/office/powerpoint/2010/main" val="895853198"/>
+      </p:ext>
+    </p:extLst>
+  </p:cSld>
+  <p:clrMapOvr>
+    <a:masterClrMapping/>
+  </p:clrMapOvr>
+</p:sld>
+</file>
+
+<file path=ppt/slides/slide21.xml><?xml version="1.0" encoding="utf-8"?>
 <p:sld xmlns:a="http://schemas.openxmlformats.org/drawingml/2006/main" xmlns:r="http://schemas.openxmlformats.org/officeDocument/2006/relationships" xmlns:p="http://schemas.openxmlformats.org/presentationml/2006/main">
   <p:cSld>
     <p:spTree>

</xml_diff>